<commit_message>
GANTT et Top Projet
</commit_message>
<xml_diff>
--- a/AB_TOPs/1_Top_Projet/Top Projet.pptx
+++ b/AB_TOPs/1_Top_Projet/Top Projet.pptx
@@ -5,17 +5,18 @@
     <p:sldMasterId id="2147483648" r:id="rId1"/>
   </p:sldMasterIdLst>
   <p:notesMasterIdLst>
-    <p:notesMasterId r:id="rId10"/>
+    <p:notesMasterId r:id="rId11"/>
   </p:notesMasterIdLst>
   <p:sldIdLst>
     <p:sldId id="256" r:id="rId2"/>
     <p:sldId id="261" r:id="rId3"/>
     <p:sldId id="257" r:id="rId4"/>
     <p:sldId id="258" r:id="rId5"/>
-    <p:sldId id="259" r:id="rId6"/>
-    <p:sldId id="260" r:id="rId7"/>
-    <p:sldId id="262" r:id="rId8"/>
-    <p:sldId id="263" r:id="rId9"/>
+    <p:sldId id="264" r:id="rId6"/>
+    <p:sldId id="259" r:id="rId7"/>
+    <p:sldId id="260" r:id="rId8"/>
+    <p:sldId id="262" r:id="rId9"/>
+    <p:sldId id="263" r:id="rId10"/>
   </p:sldIdLst>
   <p:sldSz cx="12192000" cy="6858000"/>
   <p:notesSz cx="6858000" cy="9144000"/>
@@ -204,7 +205,7 @@
           <a:p>
             <a:fld id="{A9258FD7-AA4D-4EFB-8956-C98F2360B098}" type="datetimeFigureOut">
               <a:rPr lang="fr-FR" smtClean="0"/>
-              <a:t>17/03/2019</a:t>
+              <a:t>20/03/2019</a:t>
             </a:fld>
             <a:endParaRPr lang="fr-FR"/>
           </a:p>
@@ -618,7 +619,7 @@
           <a:p>
             <a:fld id="{854B7264-E21A-4329-A994-84F7B09D33B2}" type="datetimeFigureOut">
               <a:rPr lang="fr-FR" smtClean="0"/>
-              <a:t>17/03/2019</a:t>
+              <a:t>20/03/2019</a:t>
             </a:fld>
             <a:endParaRPr lang="fr-FR"/>
           </a:p>
@@ -816,7 +817,7 @@
           <a:p>
             <a:fld id="{854B7264-E21A-4329-A994-84F7B09D33B2}" type="datetimeFigureOut">
               <a:rPr lang="fr-FR" smtClean="0"/>
-              <a:t>17/03/2019</a:t>
+              <a:t>20/03/2019</a:t>
             </a:fld>
             <a:endParaRPr lang="fr-FR"/>
           </a:p>
@@ -1024,7 +1025,7 @@
           <a:p>
             <a:fld id="{854B7264-E21A-4329-A994-84F7B09D33B2}" type="datetimeFigureOut">
               <a:rPr lang="fr-FR" smtClean="0"/>
-              <a:t>17/03/2019</a:t>
+              <a:t>20/03/2019</a:t>
             </a:fld>
             <a:endParaRPr lang="fr-FR"/>
           </a:p>
@@ -1222,7 +1223,7 @@
           <a:p>
             <a:fld id="{854B7264-E21A-4329-A994-84F7B09D33B2}" type="datetimeFigureOut">
               <a:rPr lang="fr-FR" smtClean="0"/>
-              <a:t>17/03/2019</a:t>
+              <a:t>20/03/2019</a:t>
             </a:fld>
             <a:endParaRPr lang="fr-FR"/>
           </a:p>
@@ -1497,7 +1498,7 @@
           <a:p>
             <a:fld id="{854B7264-E21A-4329-A994-84F7B09D33B2}" type="datetimeFigureOut">
               <a:rPr lang="fr-FR" smtClean="0"/>
-              <a:t>17/03/2019</a:t>
+              <a:t>20/03/2019</a:t>
             </a:fld>
             <a:endParaRPr lang="fr-FR"/>
           </a:p>
@@ -1762,7 +1763,7 @@
           <a:p>
             <a:fld id="{854B7264-E21A-4329-A994-84F7B09D33B2}" type="datetimeFigureOut">
               <a:rPr lang="fr-FR" smtClean="0"/>
-              <a:t>17/03/2019</a:t>
+              <a:t>20/03/2019</a:t>
             </a:fld>
             <a:endParaRPr lang="fr-FR"/>
           </a:p>
@@ -2174,7 +2175,7 @@
           <a:p>
             <a:fld id="{854B7264-E21A-4329-A994-84F7B09D33B2}" type="datetimeFigureOut">
               <a:rPr lang="fr-FR" smtClean="0"/>
-              <a:t>17/03/2019</a:t>
+              <a:t>20/03/2019</a:t>
             </a:fld>
             <a:endParaRPr lang="fr-FR"/>
           </a:p>
@@ -2315,7 +2316,7 @@
           <a:p>
             <a:fld id="{854B7264-E21A-4329-A994-84F7B09D33B2}" type="datetimeFigureOut">
               <a:rPr lang="fr-FR" smtClean="0"/>
-              <a:t>17/03/2019</a:t>
+              <a:t>20/03/2019</a:t>
             </a:fld>
             <a:endParaRPr lang="fr-FR"/>
           </a:p>
@@ -2428,7 +2429,7 @@
           <a:p>
             <a:fld id="{854B7264-E21A-4329-A994-84F7B09D33B2}" type="datetimeFigureOut">
               <a:rPr lang="fr-FR" smtClean="0"/>
-              <a:t>17/03/2019</a:t>
+              <a:t>20/03/2019</a:t>
             </a:fld>
             <a:endParaRPr lang="fr-FR"/>
           </a:p>
@@ -2739,7 +2740,7 @@
           <a:p>
             <a:fld id="{854B7264-E21A-4329-A994-84F7B09D33B2}" type="datetimeFigureOut">
               <a:rPr lang="fr-FR" smtClean="0"/>
-              <a:t>17/03/2019</a:t>
+              <a:t>20/03/2019</a:t>
             </a:fld>
             <a:endParaRPr lang="fr-FR"/>
           </a:p>
@@ -3027,7 +3028,7 @@
           <a:p>
             <a:fld id="{854B7264-E21A-4329-A994-84F7B09D33B2}" type="datetimeFigureOut">
               <a:rPr lang="fr-FR" smtClean="0"/>
-              <a:t>17/03/2019</a:t>
+              <a:t>20/03/2019</a:t>
             </a:fld>
             <a:endParaRPr lang="fr-FR"/>
           </a:p>
@@ -3268,7 +3269,7 @@
           <a:p>
             <a:fld id="{854B7264-E21A-4329-A994-84F7B09D33B2}" type="datetimeFigureOut">
               <a:rPr lang="fr-FR" smtClean="0"/>
-              <a:t>17/03/2019</a:t>
+              <a:t>20/03/2019</a:t>
             </a:fld>
             <a:endParaRPr lang="fr-FR"/>
           </a:p>
@@ -5078,6 +5079,203 @@
           </a:p>
         </p:txBody>
       </p:sp>
+      <p:sp>
+        <p:nvSpPr>
+          <p:cNvPr id="2" name="Flèche : droite 1">
+            <a:extLst>
+              <a:ext uri="{FF2B5EF4-FFF2-40B4-BE49-F238E27FC236}">
+                <a16:creationId xmlns:a16="http://schemas.microsoft.com/office/drawing/2014/main" id="{7A4005F0-7BA1-4699-87FD-ADAC8F9E4488}"/>
+              </a:ext>
+            </a:extLst>
+          </p:cNvPr>
+          <p:cNvSpPr/>
+          <p:nvPr/>
+        </p:nvSpPr>
+        <p:spPr>
+          <a:xfrm>
+            <a:off x="801757" y="1424032"/>
+            <a:ext cx="2272748" cy="1537829"/>
+          </a:xfrm>
+          <a:prstGeom prst="rightArrow">
+            <a:avLst/>
+          </a:prstGeom>
+          <a:solidFill>
+            <a:srgbClr val="C2381E"/>
+          </a:solidFill>
+          <a:ln>
+            <a:solidFill>
+              <a:srgbClr val="C2381E"/>
+            </a:solidFill>
+          </a:ln>
+        </p:spPr>
+        <p:style>
+          <a:lnRef idx="2">
+            <a:schemeClr val="accent1">
+              <a:shade val="50000"/>
+            </a:schemeClr>
+          </a:lnRef>
+          <a:fillRef idx="1">
+            <a:schemeClr val="accent1"/>
+          </a:fillRef>
+          <a:effectRef idx="0">
+            <a:schemeClr val="accent1"/>
+          </a:effectRef>
+          <a:fontRef idx="minor">
+            <a:schemeClr val="lt1"/>
+          </a:fontRef>
+        </p:style>
+        <p:txBody>
+          <a:bodyPr rtlCol="0" anchor="ctr"/>
+          <a:lstStyle/>
+          <a:p>
+            <a:pPr algn="ctr"/>
+            <a:r>
+              <a:rPr lang="fr-FR" dirty="0"/>
+              <a:t>Objectif:</a:t>
+            </a:r>
+          </a:p>
+        </p:txBody>
+      </p:sp>
+      <p:sp>
+        <p:nvSpPr>
+          <p:cNvPr id="3" name="Rectangle 2">
+            <a:extLst>
+              <a:ext uri="{FF2B5EF4-FFF2-40B4-BE49-F238E27FC236}">
+                <a16:creationId xmlns:a16="http://schemas.microsoft.com/office/drawing/2014/main" id="{3B959E40-E992-4AD5-9250-2A990665D14B}"/>
+              </a:ext>
+            </a:extLst>
+          </p:cNvPr>
+          <p:cNvSpPr/>
+          <p:nvPr/>
+        </p:nvSpPr>
+        <p:spPr>
+          <a:xfrm>
+            <a:off x="3207865" y="1869780"/>
+            <a:ext cx="3523400" cy="646331"/>
+          </a:xfrm>
+          <a:prstGeom prst="rect">
+            <a:avLst/>
+          </a:prstGeom>
+        </p:spPr>
+        <p:txBody>
+          <a:bodyPr wrap="none">
+            <a:spAutoFit/>
+          </a:bodyPr>
+          <a:lstStyle/>
+          <a:p>
+            <a:pPr marL="285750" indent="-285750">
+              <a:buFont typeface="Arial" panose="020B0604020202020204" pitchFamily="34" charset="0"/>
+              <a:buChar char="•"/>
+            </a:pPr>
+            <a:r>
+              <a:rPr lang="fr-FR" dirty="0"/>
+              <a:t>Avoir une longue période d’essai</a:t>
+            </a:r>
+          </a:p>
+          <a:p>
+            <a:pPr marL="285750" indent="-285750">
+              <a:buFont typeface="Arial" panose="020B0604020202020204" pitchFamily="34" charset="0"/>
+              <a:buChar char="•"/>
+            </a:pPr>
+            <a:r>
+              <a:rPr lang="fr-FR" dirty="0"/>
+              <a:t>Avoir un véhicule réglable</a:t>
+            </a:r>
+          </a:p>
+        </p:txBody>
+      </p:sp>
+      <p:sp>
+        <p:nvSpPr>
+          <p:cNvPr id="6" name="Rectangle 5">
+            <a:extLst>
+              <a:ext uri="{FF2B5EF4-FFF2-40B4-BE49-F238E27FC236}">
+                <a16:creationId xmlns:a16="http://schemas.microsoft.com/office/drawing/2014/main" id="{460AC28E-2A5A-47E8-841E-E59955F71D6F}"/>
+              </a:ext>
+            </a:extLst>
+          </p:cNvPr>
+          <p:cNvSpPr/>
+          <p:nvPr/>
+        </p:nvSpPr>
+        <p:spPr>
+          <a:xfrm>
+            <a:off x="3207865" y="3504262"/>
+            <a:ext cx="3235906" cy="646331"/>
+          </a:xfrm>
+          <a:prstGeom prst="rect">
+            <a:avLst/>
+          </a:prstGeom>
+        </p:spPr>
+        <p:txBody>
+          <a:bodyPr wrap="square">
+            <a:spAutoFit/>
+          </a:bodyPr>
+          <a:lstStyle/>
+          <a:p>
+            <a:pPr algn="ctr"/>
+            <a:r>
+              <a:rPr lang="fr-FR" dirty="0"/>
+              <a:t>Utiliser les données de capteurs lors des différentes phases</a:t>
+            </a:r>
+          </a:p>
+        </p:txBody>
+      </p:sp>
+      <p:sp>
+        <p:nvSpPr>
+          <p:cNvPr id="7" name="Flèche : droite 6">
+            <a:extLst>
+              <a:ext uri="{FF2B5EF4-FFF2-40B4-BE49-F238E27FC236}">
+                <a16:creationId xmlns:a16="http://schemas.microsoft.com/office/drawing/2014/main" id="{AFA58D9B-91D8-40C8-AF8E-3C4E602B17E8}"/>
+              </a:ext>
+            </a:extLst>
+          </p:cNvPr>
+          <p:cNvSpPr/>
+          <p:nvPr/>
+        </p:nvSpPr>
+        <p:spPr>
+          <a:xfrm>
+            <a:off x="801757" y="3058514"/>
+            <a:ext cx="2272748" cy="1537829"/>
+          </a:xfrm>
+          <a:prstGeom prst="rightArrow">
+            <a:avLst/>
+          </a:prstGeom>
+          <a:solidFill>
+            <a:srgbClr val="C2381E"/>
+          </a:solidFill>
+          <a:ln>
+            <a:solidFill>
+              <a:srgbClr val="C2381E"/>
+            </a:solidFill>
+          </a:ln>
+        </p:spPr>
+        <p:style>
+          <a:lnRef idx="2">
+            <a:schemeClr val="accent1">
+              <a:shade val="50000"/>
+            </a:schemeClr>
+          </a:lnRef>
+          <a:fillRef idx="1">
+            <a:schemeClr val="accent1"/>
+          </a:fillRef>
+          <a:effectRef idx="0">
+            <a:schemeClr val="accent1"/>
+          </a:effectRef>
+          <a:fontRef idx="minor">
+            <a:schemeClr val="lt1"/>
+          </a:fontRef>
+        </p:style>
+        <p:txBody>
+          <a:bodyPr rtlCol="0" anchor="ctr"/>
+          <a:lstStyle/>
+          <a:p>
+            <a:pPr algn="ctr"/>
+            <a:r>
+              <a:rPr lang="fr-FR" dirty="0"/>
+              <a:t>Objectif:</a:t>
+            </a:r>
+          </a:p>
+        </p:txBody>
+      </p:sp>
     </p:spTree>
     <p:extLst>
       <p:ext uri="{BB962C8B-B14F-4D97-AF65-F5344CB8AC3E}">
@@ -6617,15 +6815,2865 @@
                   <a:srgbClr val="C2381E"/>
                 </a:solidFill>
               </a:rPr>
-              <a:t>TOP Projet : Budget financier</a:t>
+              <a:t>TOP Projet : Résultats recherchés</a:t>
             </a:r>
           </a:p>
         </p:txBody>
       </p:sp>
+      <p:graphicFrame>
+        <p:nvGraphicFramePr>
+          <p:cNvPr id="6" name="Tableau 5">
+            <a:extLst>
+              <a:ext uri="{FF2B5EF4-FFF2-40B4-BE49-F238E27FC236}">
+                <a16:creationId xmlns:a16="http://schemas.microsoft.com/office/drawing/2014/main" id="{E0EEDBC3-2494-4079-B0C8-80C9145C6809}"/>
+              </a:ext>
+            </a:extLst>
+          </p:cNvPr>
+          <p:cNvGraphicFramePr>
+            <a:graphicFrameLocks noGrp="1"/>
+          </p:cNvGraphicFramePr>
+          <p:nvPr>
+            <p:extLst>
+              <p:ext uri="{D42A27DB-BD31-4B8C-83A1-F6EECF244321}">
+                <p14:modId xmlns:p14="http://schemas.microsoft.com/office/powerpoint/2010/main" val="1163848168"/>
+              </p:ext>
+            </p:extLst>
+          </p:nvPr>
+        </p:nvGraphicFramePr>
+        <p:xfrm>
+          <a:off x="838197" y="1569984"/>
+          <a:ext cx="10515603" cy="2969832"/>
+        </p:xfrm>
+        <a:graphic>
+          <a:graphicData uri="http://schemas.openxmlformats.org/drawingml/2006/table">
+            <a:tbl>
+              <a:tblPr firstRow="1" firstCol="1" bandRow="1">
+                <a:tableStyleId>{073A0DAA-6AF3-43AB-8588-CEC1D06C72B9}</a:tableStyleId>
+              </a:tblPr>
+              <a:tblGrid>
+                <a:gridCol w="441963">
+                  <a:extLst>
+                    <a:ext uri="{9D8B030D-6E8A-4147-A177-3AD203B41FA5}">
+                      <a16:colId xmlns:a16="http://schemas.microsoft.com/office/drawing/2014/main" val="330744929"/>
+                    </a:ext>
+                  </a:extLst>
+                </a:gridCol>
+                <a:gridCol w="1534160">
+                  <a:extLst>
+                    <a:ext uri="{9D8B030D-6E8A-4147-A177-3AD203B41FA5}">
+                      <a16:colId xmlns:a16="http://schemas.microsoft.com/office/drawing/2014/main" val="2921328971"/>
+                    </a:ext>
+                  </a:extLst>
+                </a:gridCol>
+                <a:gridCol w="472440">
+                  <a:extLst>
+                    <a:ext uri="{9D8B030D-6E8A-4147-A177-3AD203B41FA5}">
+                      <a16:colId xmlns:a16="http://schemas.microsoft.com/office/drawing/2014/main" val="886359061"/>
+                    </a:ext>
+                  </a:extLst>
+                </a:gridCol>
+                <a:gridCol w="1623170">
+                  <a:extLst>
+                    <a:ext uri="{9D8B030D-6E8A-4147-A177-3AD203B41FA5}">
+                      <a16:colId xmlns:a16="http://schemas.microsoft.com/office/drawing/2014/main" val="3752719890"/>
+                    </a:ext>
+                  </a:extLst>
+                </a:gridCol>
+                <a:gridCol w="2517913">
+                  <a:extLst>
+                    <a:ext uri="{9D8B030D-6E8A-4147-A177-3AD203B41FA5}">
+                      <a16:colId xmlns:a16="http://schemas.microsoft.com/office/drawing/2014/main" val="2776574227"/>
+                    </a:ext>
+                  </a:extLst>
+                </a:gridCol>
+                <a:gridCol w="2423728">
+                  <a:extLst>
+                    <a:ext uri="{9D8B030D-6E8A-4147-A177-3AD203B41FA5}">
+                      <a16:colId xmlns:a16="http://schemas.microsoft.com/office/drawing/2014/main" val="929444312"/>
+                    </a:ext>
+                  </a:extLst>
+                </a:gridCol>
+                <a:gridCol w="1502229">
+                  <a:extLst>
+                    <a:ext uri="{9D8B030D-6E8A-4147-A177-3AD203B41FA5}">
+                      <a16:colId xmlns:a16="http://schemas.microsoft.com/office/drawing/2014/main" val="2585179410"/>
+                    </a:ext>
+                  </a:extLst>
+                </a:gridCol>
+              </a:tblGrid>
+              <a:tr h="187071">
+                <a:tc gridSpan="2">
+                  <a:txBody>
+                    <a:bodyPr/>
+                    <a:lstStyle/>
+                    <a:p>
+                      <a:pPr>
+                        <a:lnSpc>
+                          <a:spcPct val="107000"/>
+                        </a:lnSpc>
+                        <a:spcAft>
+                          <a:spcPts val="0"/>
+                        </a:spcAft>
+                      </a:pPr>
+                      <a:r>
+                        <a:rPr lang="fr-FR" sz="1200" dirty="0">
+                          <a:effectLst/>
+                        </a:rPr>
+                        <a:t>Fonction principale</a:t>
+                      </a:r>
+                      <a:endParaRPr lang="fr-FR" sz="1100" dirty="0">
+                        <a:effectLst/>
+                        <a:latin typeface="Calibri" panose="020F0502020204030204" pitchFamily="34" charset="0"/>
+                        <a:ea typeface="Calibri" panose="020F0502020204030204" pitchFamily="34" charset="0"/>
+                        <a:cs typeface="Times New Roman" panose="02020603050405020304" pitchFamily="18" charset="0"/>
+                      </a:endParaRPr>
+                    </a:p>
+                  </a:txBody>
+                  <a:tcPr marL="68580" marR="68580" marT="0" marB="0"/>
+                </a:tc>
+                <a:tc hMerge="1">
+                  <a:txBody>
+                    <a:bodyPr/>
+                    <a:lstStyle/>
+                    <a:p>
+                      <a:endParaRPr lang="fr-FR"/>
+                    </a:p>
+                  </a:txBody>
+                  <a:tcPr/>
+                </a:tc>
+                <a:tc gridSpan="2">
+                  <a:txBody>
+                    <a:bodyPr/>
+                    <a:lstStyle/>
+                    <a:p>
+                      <a:pPr>
+                        <a:lnSpc>
+                          <a:spcPct val="107000"/>
+                        </a:lnSpc>
+                        <a:spcAft>
+                          <a:spcPts val="0"/>
+                        </a:spcAft>
+                      </a:pPr>
+                      <a:r>
+                        <a:rPr lang="fr-FR" sz="1200">
+                          <a:effectLst/>
+                        </a:rPr>
+                        <a:t>Fonction secondaire</a:t>
+                      </a:r>
+                      <a:endParaRPr lang="fr-FR" sz="1100">
+                        <a:effectLst/>
+                        <a:latin typeface="Calibri" panose="020F0502020204030204" pitchFamily="34" charset="0"/>
+                        <a:ea typeface="Calibri" panose="020F0502020204030204" pitchFamily="34" charset="0"/>
+                        <a:cs typeface="Times New Roman" panose="02020603050405020304" pitchFamily="18" charset="0"/>
+                      </a:endParaRPr>
+                    </a:p>
+                  </a:txBody>
+                  <a:tcPr marL="68580" marR="68580" marT="0" marB="0"/>
+                </a:tc>
+                <a:tc hMerge="1">
+                  <a:txBody>
+                    <a:bodyPr/>
+                    <a:lstStyle/>
+                    <a:p>
+                      <a:endParaRPr lang="fr-FR"/>
+                    </a:p>
+                  </a:txBody>
+                  <a:tcPr/>
+                </a:tc>
+                <a:tc>
+                  <a:txBody>
+                    <a:bodyPr/>
+                    <a:lstStyle/>
+                    <a:p>
+                      <a:pPr>
+                        <a:lnSpc>
+                          <a:spcPct val="107000"/>
+                        </a:lnSpc>
+                        <a:spcAft>
+                          <a:spcPts val="0"/>
+                        </a:spcAft>
+                      </a:pPr>
+                      <a:r>
+                        <a:rPr lang="fr-FR" sz="1200">
+                          <a:effectLst/>
+                        </a:rPr>
+                        <a:t>Critère fonctionnel</a:t>
+                      </a:r>
+                      <a:endParaRPr lang="fr-FR" sz="1100">
+                        <a:effectLst/>
+                        <a:latin typeface="Calibri" panose="020F0502020204030204" pitchFamily="34" charset="0"/>
+                        <a:ea typeface="Calibri" panose="020F0502020204030204" pitchFamily="34" charset="0"/>
+                        <a:cs typeface="Times New Roman" panose="02020603050405020304" pitchFamily="18" charset="0"/>
+                      </a:endParaRPr>
+                    </a:p>
+                  </a:txBody>
+                  <a:tcPr marL="68580" marR="68580" marT="0" marB="0"/>
+                </a:tc>
+                <a:tc>
+                  <a:txBody>
+                    <a:bodyPr/>
+                    <a:lstStyle/>
+                    <a:p>
+                      <a:pPr>
+                        <a:lnSpc>
+                          <a:spcPct val="107000"/>
+                        </a:lnSpc>
+                        <a:spcAft>
+                          <a:spcPts val="0"/>
+                        </a:spcAft>
+                      </a:pPr>
+                      <a:r>
+                        <a:rPr lang="fr-FR" sz="1200">
+                          <a:effectLst/>
+                        </a:rPr>
+                        <a:t>Niveau</a:t>
+                      </a:r>
+                      <a:endParaRPr lang="fr-FR" sz="1100">
+                        <a:effectLst/>
+                        <a:latin typeface="Calibri" panose="020F0502020204030204" pitchFamily="34" charset="0"/>
+                        <a:ea typeface="Calibri" panose="020F0502020204030204" pitchFamily="34" charset="0"/>
+                        <a:cs typeface="Times New Roman" panose="02020603050405020304" pitchFamily="18" charset="0"/>
+                      </a:endParaRPr>
+                    </a:p>
+                  </a:txBody>
+                  <a:tcPr marL="68580" marR="68580" marT="0" marB="0"/>
+                </a:tc>
+                <a:tc>
+                  <a:txBody>
+                    <a:bodyPr/>
+                    <a:lstStyle/>
+                    <a:p>
+                      <a:pPr>
+                        <a:lnSpc>
+                          <a:spcPct val="107000"/>
+                        </a:lnSpc>
+                        <a:spcAft>
+                          <a:spcPts val="0"/>
+                        </a:spcAft>
+                      </a:pPr>
+                      <a:r>
+                        <a:rPr lang="fr-FR" sz="1200">
+                          <a:effectLst/>
+                        </a:rPr>
+                        <a:t>Flexibilité</a:t>
+                      </a:r>
+                      <a:endParaRPr lang="fr-FR" sz="1100">
+                        <a:effectLst/>
+                        <a:latin typeface="Calibri" panose="020F0502020204030204" pitchFamily="34" charset="0"/>
+                        <a:ea typeface="Calibri" panose="020F0502020204030204" pitchFamily="34" charset="0"/>
+                        <a:cs typeface="Times New Roman" panose="02020603050405020304" pitchFamily="18" charset="0"/>
+                      </a:endParaRPr>
+                    </a:p>
+                  </a:txBody>
+                  <a:tcPr marL="68580" marR="68580" marT="0" marB="0"/>
+                </a:tc>
+                <a:extLst>
+                  <a:ext uri="{0D108BD9-81ED-4DB2-BD59-A6C34878D82A}">
+                    <a16:rowId xmlns:a16="http://schemas.microsoft.com/office/drawing/2014/main" val="4011943364"/>
+                  </a:ext>
+                </a:extLst>
+              </a:tr>
+              <a:tr h="187071">
+                <a:tc>
+                  <a:txBody>
+                    <a:bodyPr/>
+                    <a:lstStyle/>
+                    <a:p>
+                      <a:pPr>
+                        <a:lnSpc>
+                          <a:spcPct val="107000"/>
+                        </a:lnSpc>
+                        <a:spcAft>
+                          <a:spcPts val="0"/>
+                        </a:spcAft>
+                      </a:pPr>
+                      <a:r>
+                        <a:rPr lang="fr-FR" sz="1100" dirty="0">
+                          <a:effectLst/>
+                          <a:latin typeface="+mn-lt"/>
+                          <a:ea typeface="Calibri" panose="020F0502020204030204" pitchFamily="34" charset="0"/>
+                          <a:cs typeface="Times New Roman" panose="02020603050405020304" pitchFamily="18" charset="0"/>
+                        </a:rPr>
+                        <a:t>FP1</a:t>
+                      </a:r>
+                    </a:p>
+                  </a:txBody>
+                  <a:tcPr marL="68580" marR="68580" marT="0" marB="0"/>
+                </a:tc>
+                <a:tc>
+                  <a:txBody>
+                    <a:bodyPr/>
+                    <a:lstStyle/>
+                    <a:p>
+                      <a:pPr>
+                        <a:lnSpc>
+                          <a:spcPct val="107000"/>
+                        </a:lnSpc>
+                        <a:spcAft>
+                          <a:spcPts val="0"/>
+                        </a:spcAft>
+                      </a:pPr>
+                      <a:r>
+                        <a:rPr lang="fr-FR" sz="1100" dirty="0">
+                          <a:effectLst/>
+                          <a:latin typeface="+mn-lt"/>
+                          <a:ea typeface="Calibri" panose="020F0502020204030204" pitchFamily="34" charset="0"/>
+                          <a:cs typeface="Times New Roman" panose="02020603050405020304" pitchFamily="18" charset="0"/>
+                        </a:rPr>
+                        <a:t>Respecter le règlement</a:t>
+                      </a:r>
+                    </a:p>
+                  </a:txBody>
+                  <a:tcPr marL="68580" marR="68580" marT="0" marB="0"/>
+                </a:tc>
+                <a:tc>
+                  <a:txBody>
+                    <a:bodyPr/>
+                    <a:lstStyle/>
+                    <a:p>
+                      <a:pPr>
+                        <a:lnSpc>
+                          <a:spcPct val="107000"/>
+                        </a:lnSpc>
+                        <a:spcAft>
+                          <a:spcPts val="0"/>
+                        </a:spcAft>
+                      </a:pPr>
+                      <a:endParaRPr lang="fr-FR" sz="1100" dirty="0">
+                        <a:effectLst/>
+                        <a:latin typeface="+mn-lt"/>
+                        <a:ea typeface="Calibri" panose="020F0502020204030204" pitchFamily="34" charset="0"/>
+                        <a:cs typeface="Times New Roman" panose="02020603050405020304" pitchFamily="18" charset="0"/>
+                      </a:endParaRPr>
+                    </a:p>
+                  </a:txBody>
+                  <a:tcPr marL="68580" marR="68580" marT="0" marB="0"/>
+                </a:tc>
+                <a:tc>
+                  <a:txBody>
+                    <a:bodyPr/>
+                    <a:lstStyle/>
+                    <a:p>
+                      <a:pPr>
+                        <a:lnSpc>
+                          <a:spcPct val="107000"/>
+                        </a:lnSpc>
+                        <a:spcAft>
+                          <a:spcPts val="0"/>
+                        </a:spcAft>
+                      </a:pPr>
+                      <a:endParaRPr lang="fr-FR" sz="1100" dirty="0">
+                        <a:effectLst/>
+                        <a:latin typeface="+mn-lt"/>
+                        <a:ea typeface="Calibri" panose="020F0502020204030204" pitchFamily="34" charset="0"/>
+                        <a:cs typeface="Times New Roman" panose="02020603050405020304" pitchFamily="18" charset="0"/>
+                      </a:endParaRPr>
+                    </a:p>
+                  </a:txBody>
+                  <a:tcPr marL="68580" marR="68580" marT="0" marB="0"/>
+                </a:tc>
+                <a:tc>
+                  <a:txBody>
+                    <a:bodyPr/>
+                    <a:lstStyle/>
+                    <a:p>
+                      <a:pPr>
+                        <a:lnSpc>
+                          <a:spcPct val="107000"/>
+                        </a:lnSpc>
+                        <a:spcAft>
+                          <a:spcPts val="0"/>
+                        </a:spcAft>
+                      </a:pPr>
+                      <a:r>
+                        <a:rPr lang="fr-FR" sz="1100">
+                          <a:effectLst/>
+                          <a:latin typeface="+mn-lt"/>
+                        </a:rPr>
+                        <a:t> </a:t>
+                      </a:r>
+                      <a:endParaRPr lang="fr-FR" sz="1100">
+                        <a:effectLst/>
+                        <a:latin typeface="+mn-lt"/>
+                        <a:ea typeface="Calibri" panose="020F0502020204030204" pitchFamily="34" charset="0"/>
+                        <a:cs typeface="Times New Roman" panose="02020603050405020304" pitchFamily="18" charset="0"/>
+                      </a:endParaRPr>
+                    </a:p>
+                  </a:txBody>
+                  <a:tcPr marL="68580" marR="68580" marT="0" marB="0"/>
+                </a:tc>
+                <a:tc>
+                  <a:txBody>
+                    <a:bodyPr/>
+                    <a:lstStyle/>
+                    <a:p>
+                      <a:pPr>
+                        <a:lnSpc>
+                          <a:spcPct val="107000"/>
+                        </a:lnSpc>
+                        <a:spcAft>
+                          <a:spcPts val="0"/>
+                        </a:spcAft>
+                      </a:pPr>
+                      <a:r>
+                        <a:rPr lang="fr-FR" sz="1100">
+                          <a:effectLst/>
+                          <a:latin typeface="+mn-lt"/>
+                        </a:rPr>
+                        <a:t> </a:t>
+                      </a:r>
+                      <a:endParaRPr lang="fr-FR" sz="1100">
+                        <a:effectLst/>
+                        <a:latin typeface="+mn-lt"/>
+                        <a:ea typeface="Calibri" panose="020F0502020204030204" pitchFamily="34" charset="0"/>
+                        <a:cs typeface="Times New Roman" panose="02020603050405020304" pitchFamily="18" charset="0"/>
+                      </a:endParaRPr>
+                    </a:p>
+                  </a:txBody>
+                  <a:tcPr marL="68580" marR="68580" marT="0" marB="0"/>
+                </a:tc>
+                <a:tc>
+                  <a:txBody>
+                    <a:bodyPr/>
+                    <a:lstStyle/>
+                    <a:p>
+                      <a:pPr>
+                        <a:lnSpc>
+                          <a:spcPct val="107000"/>
+                        </a:lnSpc>
+                        <a:spcAft>
+                          <a:spcPts val="0"/>
+                        </a:spcAft>
+                      </a:pPr>
+                      <a:r>
+                        <a:rPr lang="fr-FR" sz="1100" dirty="0">
+                          <a:effectLst/>
+                          <a:latin typeface="+mn-lt"/>
+                        </a:rPr>
+                        <a:t> Aucune</a:t>
+                      </a:r>
+                      <a:endParaRPr lang="fr-FR" sz="1100" dirty="0">
+                        <a:effectLst/>
+                        <a:latin typeface="+mn-lt"/>
+                        <a:ea typeface="Calibri" panose="020F0502020204030204" pitchFamily="34" charset="0"/>
+                        <a:cs typeface="Times New Roman" panose="02020603050405020304" pitchFamily="18" charset="0"/>
+                      </a:endParaRPr>
+                    </a:p>
+                  </a:txBody>
+                  <a:tcPr marL="68580" marR="68580" marT="0" marB="0"/>
+                </a:tc>
+                <a:extLst>
+                  <a:ext uri="{0D108BD9-81ED-4DB2-BD59-A6C34878D82A}">
+                    <a16:rowId xmlns:a16="http://schemas.microsoft.com/office/drawing/2014/main" val="3613842555"/>
+                  </a:ext>
+                </a:extLst>
+              </a:tr>
+              <a:tr h="187071">
+                <a:tc>
+                  <a:txBody>
+                    <a:bodyPr/>
+                    <a:lstStyle/>
+                    <a:p>
+                      <a:pPr>
+                        <a:lnSpc>
+                          <a:spcPct val="107000"/>
+                        </a:lnSpc>
+                        <a:spcAft>
+                          <a:spcPts val="0"/>
+                        </a:spcAft>
+                      </a:pPr>
+                      <a:r>
+                        <a:rPr lang="fr-FR" sz="1100" dirty="0">
+                          <a:effectLst/>
+                          <a:latin typeface="+mn-lt"/>
+                          <a:ea typeface="Calibri" panose="020F0502020204030204" pitchFamily="34" charset="0"/>
+                          <a:cs typeface="Times New Roman" panose="02020603050405020304" pitchFamily="18" charset="0"/>
+                        </a:rPr>
+                        <a:t>FP2</a:t>
+                      </a:r>
+                    </a:p>
+                  </a:txBody>
+                  <a:tcPr marL="68580" marR="68580" marT="0" marB="0"/>
+                </a:tc>
+                <a:tc>
+                  <a:txBody>
+                    <a:bodyPr/>
+                    <a:lstStyle/>
+                    <a:p>
+                      <a:pPr>
+                        <a:lnSpc>
+                          <a:spcPct val="107000"/>
+                        </a:lnSpc>
+                        <a:spcAft>
+                          <a:spcPts val="0"/>
+                        </a:spcAft>
+                      </a:pPr>
+                      <a:r>
+                        <a:rPr lang="fr-FR" sz="1100" dirty="0">
+                          <a:effectLst/>
+                          <a:latin typeface="+mn-lt"/>
+                          <a:ea typeface="Calibri" panose="020F0502020204030204" pitchFamily="34" charset="0"/>
+                          <a:cs typeface="Times New Roman" panose="02020603050405020304" pitchFamily="18" charset="0"/>
+                        </a:rPr>
+                        <a:t>Respecter les délais</a:t>
+                      </a:r>
+                    </a:p>
+                  </a:txBody>
+                  <a:tcPr marL="68580" marR="68580" marT="0" marB="0"/>
+                </a:tc>
+                <a:tc>
+                  <a:txBody>
+                    <a:bodyPr/>
+                    <a:lstStyle/>
+                    <a:p>
+                      <a:pPr>
+                        <a:lnSpc>
+                          <a:spcPct val="107000"/>
+                        </a:lnSpc>
+                        <a:spcAft>
+                          <a:spcPts val="0"/>
+                        </a:spcAft>
+                      </a:pPr>
+                      <a:endParaRPr lang="fr-FR" sz="1100" dirty="0">
+                        <a:effectLst/>
+                        <a:latin typeface="+mn-lt"/>
+                        <a:ea typeface="Calibri" panose="020F0502020204030204" pitchFamily="34" charset="0"/>
+                        <a:cs typeface="Times New Roman" panose="02020603050405020304" pitchFamily="18" charset="0"/>
+                      </a:endParaRPr>
+                    </a:p>
+                  </a:txBody>
+                  <a:tcPr marL="68580" marR="68580" marT="0" marB="0"/>
+                </a:tc>
+                <a:tc>
+                  <a:txBody>
+                    <a:bodyPr/>
+                    <a:lstStyle/>
+                    <a:p>
+                      <a:pPr>
+                        <a:lnSpc>
+                          <a:spcPct val="107000"/>
+                        </a:lnSpc>
+                        <a:spcAft>
+                          <a:spcPts val="0"/>
+                        </a:spcAft>
+                      </a:pPr>
+                      <a:endParaRPr lang="fr-FR" sz="1100">
+                        <a:effectLst/>
+                        <a:latin typeface="+mn-lt"/>
+                        <a:ea typeface="Calibri" panose="020F0502020204030204" pitchFamily="34" charset="0"/>
+                        <a:cs typeface="Times New Roman" panose="02020603050405020304" pitchFamily="18" charset="0"/>
+                      </a:endParaRPr>
+                    </a:p>
+                  </a:txBody>
+                  <a:tcPr marL="68580" marR="68580" marT="0" marB="0"/>
+                </a:tc>
+                <a:tc>
+                  <a:txBody>
+                    <a:bodyPr/>
+                    <a:lstStyle/>
+                    <a:p>
+                      <a:pPr>
+                        <a:lnSpc>
+                          <a:spcPct val="107000"/>
+                        </a:lnSpc>
+                        <a:spcAft>
+                          <a:spcPts val="0"/>
+                        </a:spcAft>
+                      </a:pPr>
+                      <a:endParaRPr lang="fr-FR" sz="1100">
+                        <a:effectLst/>
+                        <a:latin typeface="+mn-lt"/>
+                        <a:ea typeface="Calibri" panose="020F0502020204030204" pitchFamily="34" charset="0"/>
+                        <a:cs typeface="Times New Roman" panose="02020603050405020304" pitchFamily="18" charset="0"/>
+                      </a:endParaRPr>
+                    </a:p>
+                  </a:txBody>
+                  <a:tcPr marL="68580" marR="68580" marT="0" marB="0"/>
+                </a:tc>
+                <a:tc>
+                  <a:txBody>
+                    <a:bodyPr/>
+                    <a:lstStyle/>
+                    <a:p>
+                      <a:pPr>
+                        <a:lnSpc>
+                          <a:spcPct val="107000"/>
+                        </a:lnSpc>
+                        <a:spcAft>
+                          <a:spcPts val="0"/>
+                        </a:spcAft>
+                      </a:pPr>
+                      <a:endParaRPr lang="fr-FR" sz="1100">
+                        <a:effectLst/>
+                        <a:latin typeface="+mn-lt"/>
+                        <a:ea typeface="Calibri" panose="020F0502020204030204" pitchFamily="34" charset="0"/>
+                        <a:cs typeface="Times New Roman" panose="02020603050405020304" pitchFamily="18" charset="0"/>
+                      </a:endParaRPr>
+                    </a:p>
+                  </a:txBody>
+                  <a:tcPr marL="68580" marR="68580" marT="0" marB="0"/>
+                </a:tc>
+                <a:tc>
+                  <a:txBody>
+                    <a:bodyPr/>
+                    <a:lstStyle/>
+                    <a:p>
+                      <a:pPr>
+                        <a:lnSpc>
+                          <a:spcPct val="107000"/>
+                        </a:lnSpc>
+                        <a:spcAft>
+                          <a:spcPts val="0"/>
+                        </a:spcAft>
+                      </a:pPr>
+                      <a:endParaRPr lang="fr-FR" sz="1100">
+                        <a:effectLst/>
+                        <a:latin typeface="+mn-lt"/>
+                        <a:ea typeface="Calibri" panose="020F0502020204030204" pitchFamily="34" charset="0"/>
+                        <a:cs typeface="Times New Roman" panose="02020603050405020304" pitchFamily="18" charset="0"/>
+                      </a:endParaRPr>
+                    </a:p>
+                  </a:txBody>
+                  <a:tcPr marL="68580" marR="68580" marT="0" marB="0"/>
+                </a:tc>
+                <a:extLst>
+                  <a:ext uri="{0D108BD9-81ED-4DB2-BD59-A6C34878D82A}">
+                    <a16:rowId xmlns:a16="http://schemas.microsoft.com/office/drawing/2014/main" val="418558005"/>
+                  </a:ext>
+                </a:extLst>
+              </a:tr>
+              <a:tr h="187071">
+                <a:tc>
+                  <a:txBody>
+                    <a:bodyPr/>
+                    <a:lstStyle/>
+                    <a:p>
+                      <a:pPr>
+                        <a:lnSpc>
+                          <a:spcPct val="107000"/>
+                        </a:lnSpc>
+                        <a:spcAft>
+                          <a:spcPts val="0"/>
+                        </a:spcAft>
+                      </a:pPr>
+                      <a:r>
+                        <a:rPr lang="fr-FR" sz="1100" dirty="0">
+                          <a:effectLst/>
+                          <a:latin typeface="+mn-lt"/>
+                          <a:ea typeface="Calibri" panose="020F0502020204030204" pitchFamily="34" charset="0"/>
+                          <a:cs typeface="Times New Roman" panose="02020603050405020304" pitchFamily="18" charset="0"/>
+                        </a:rPr>
+                        <a:t>FP3</a:t>
+                      </a:r>
+                    </a:p>
+                  </a:txBody>
+                  <a:tcPr marL="68580" marR="68580" marT="0" marB="0"/>
+                </a:tc>
+                <a:tc>
+                  <a:txBody>
+                    <a:bodyPr/>
+                    <a:lstStyle/>
+                    <a:p>
+                      <a:pPr>
+                        <a:lnSpc>
+                          <a:spcPct val="107000"/>
+                        </a:lnSpc>
+                        <a:spcAft>
+                          <a:spcPts val="0"/>
+                        </a:spcAft>
+                      </a:pPr>
+                      <a:r>
+                        <a:rPr lang="fr-FR" sz="1100" dirty="0">
+                          <a:effectLst/>
+                          <a:latin typeface="+mn-lt"/>
+                          <a:ea typeface="Calibri" panose="020F0502020204030204" pitchFamily="34" charset="0"/>
+                          <a:cs typeface="Times New Roman" panose="02020603050405020304" pitchFamily="18" charset="0"/>
+                        </a:rPr>
+                        <a:t>Masse</a:t>
+                      </a:r>
+                    </a:p>
+                  </a:txBody>
+                  <a:tcPr marL="68580" marR="68580" marT="0" marB="0"/>
+                </a:tc>
+                <a:tc>
+                  <a:txBody>
+                    <a:bodyPr/>
+                    <a:lstStyle/>
+                    <a:p>
+                      <a:pPr>
+                        <a:lnSpc>
+                          <a:spcPct val="107000"/>
+                        </a:lnSpc>
+                        <a:spcAft>
+                          <a:spcPts val="0"/>
+                        </a:spcAft>
+                      </a:pPr>
+                      <a:endParaRPr lang="fr-FR" sz="1100" dirty="0">
+                        <a:effectLst/>
+                        <a:latin typeface="+mn-lt"/>
+                        <a:ea typeface="Calibri" panose="020F0502020204030204" pitchFamily="34" charset="0"/>
+                        <a:cs typeface="Times New Roman" panose="02020603050405020304" pitchFamily="18" charset="0"/>
+                      </a:endParaRPr>
+                    </a:p>
+                  </a:txBody>
+                  <a:tcPr marL="68580" marR="68580" marT="0" marB="0"/>
+                </a:tc>
+                <a:tc>
+                  <a:txBody>
+                    <a:bodyPr/>
+                    <a:lstStyle/>
+                    <a:p>
+                      <a:pPr>
+                        <a:lnSpc>
+                          <a:spcPct val="107000"/>
+                        </a:lnSpc>
+                        <a:spcAft>
+                          <a:spcPts val="0"/>
+                        </a:spcAft>
+                      </a:pPr>
+                      <a:endParaRPr lang="fr-FR" sz="1100" dirty="0">
+                        <a:effectLst/>
+                        <a:latin typeface="+mn-lt"/>
+                        <a:ea typeface="Calibri" panose="020F0502020204030204" pitchFamily="34" charset="0"/>
+                        <a:cs typeface="Times New Roman" panose="02020603050405020304" pitchFamily="18" charset="0"/>
+                      </a:endParaRPr>
+                    </a:p>
+                  </a:txBody>
+                  <a:tcPr marL="68580" marR="68580" marT="0" marB="0"/>
+                </a:tc>
+                <a:tc>
+                  <a:txBody>
+                    <a:bodyPr/>
+                    <a:lstStyle/>
+                    <a:p>
+                      <a:pPr>
+                        <a:lnSpc>
+                          <a:spcPct val="107000"/>
+                        </a:lnSpc>
+                        <a:spcAft>
+                          <a:spcPts val="0"/>
+                        </a:spcAft>
+                      </a:pPr>
+                      <a:endParaRPr lang="fr-FR" sz="1100" dirty="0">
+                        <a:effectLst/>
+                        <a:latin typeface="+mn-lt"/>
+                        <a:ea typeface="Calibri" panose="020F0502020204030204" pitchFamily="34" charset="0"/>
+                        <a:cs typeface="Times New Roman" panose="02020603050405020304" pitchFamily="18" charset="0"/>
+                      </a:endParaRPr>
+                    </a:p>
+                  </a:txBody>
+                  <a:tcPr marL="68580" marR="68580" marT="0" marB="0"/>
+                </a:tc>
+                <a:tc>
+                  <a:txBody>
+                    <a:bodyPr/>
+                    <a:lstStyle/>
+                    <a:p>
+                      <a:pPr>
+                        <a:lnSpc>
+                          <a:spcPct val="107000"/>
+                        </a:lnSpc>
+                        <a:spcAft>
+                          <a:spcPts val="0"/>
+                        </a:spcAft>
+                      </a:pPr>
+                      <a:endParaRPr lang="fr-FR" sz="1100" dirty="0">
+                        <a:effectLst/>
+                        <a:latin typeface="+mn-lt"/>
+                        <a:ea typeface="Calibri" panose="020F0502020204030204" pitchFamily="34" charset="0"/>
+                        <a:cs typeface="Times New Roman" panose="02020603050405020304" pitchFamily="18" charset="0"/>
+                      </a:endParaRPr>
+                    </a:p>
+                  </a:txBody>
+                  <a:tcPr marL="68580" marR="68580" marT="0" marB="0"/>
+                </a:tc>
+                <a:tc>
+                  <a:txBody>
+                    <a:bodyPr/>
+                    <a:lstStyle/>
+                    <a:p>
+                      <a:pPr>
+                        <a:lnSpc>
+                          <a:spcPct val="107000"/>
+                        </a:lnSpc>
+                        <a:spcAft>
+                          <a:spcPts val="0"/>
+                        </a:spcAft>
+                      </a:pPr>
+                      <a:endParaRPr lang="fr-FR" sz="1100" dirty="0">
+                        <a:effectLst/>
+                        <a:latin typeface="+mn-lt"/>
+                        <a:ea typeface="Calibri" panose="020F0502020204030204" pitchFamily="34" charset="0"/>
+                        <a:cs typeface="Times New Roman" panose="02020603050405020304" pitchFamily="18" charset="0"/>
+                      </a:endParaRPr>
+                    </a:p>
+                  </a:txBody>
+                  <a:tcPr marL="68580" marR="68580" marT="0" marB="0"/>
+                </a:tc>
+                <a:extLst>
+                  <a:ext uri="{0D108BD9-81ED-4DB2-BD59-A6C34878D82A}">
+                    <a16:rowId xmlns:a16="http://schemas.microsoft.com/office/drawing/2014/main" val="3586083713"/>
+                  </a:ext>
+                </a:extLst>
+              </a:tr>
+              <a:tr h="187071">
+                <a:tc rowSpan="4">
+                  <a:txBody>
+                    <a:bodyPr/>
+                    <a:lstStyle/>
+                    <a:p>
+                      <a:pPr>
+                        <a:lnSpc>
+                          <a:spcPct val="107000"/>
+                        </a:lnSpc>
+                        <a:spcAft>
+                          <a:spcPts val="0"/>
+                        </a:spcAft>
+                      </a:pPr>
+                      <a:r>
+                        <a:rPr lang="fr-FR" sz="1100" dirty="0">
+                          <a:effectLst/>
+                          <a:latin typeface="+mn-lt"/>
+                          <a:ea typeface="Calibri" panose="020F0502020204030204" pitchFamily="34" charset="0"/>
+                          <a:cs typeface="Times New Roman" panose="02020603050405020304" pitchFamily="18" charset="0"/>
+                        </a:rPr>
+                        <a:t>FP4</a:t>
+                      </a:r>
+                    </a:p>
+                  </a:txBody>
+                  <a:tcPr marL="68580" marR="68580" marT="0" marB="0"/>
+                </a:tc>
+                <a:tc rowSpan="4">
+                  <a:txBody>
+                    <a:bodyPr/>
+                    <a:lstStyle/>
+                    <a:p>
+                      <a:pPr>
+                        <a:lnSpc>
+                          <a:spcPct val="107000"/>
+                        </a:lnSpc>
+                        <a:spcAft>
+                          <a:spcPts val="0"/>
+                        </a:spcAft>
+                      </a:pPr>
+                      <a:r>
+                        <a:rPr lang="fr-FR" sz="1100" dirty="0">
+                          <a:effectLst/>
+                          <a:latin typeface="+mn-lt"/>
+                          <a:ea typeface="Calibri" panose="020F0502020204030204" pitchFamily="34" charset="0"/>
+                          <a:cs typeface="Times New Roman" panose="02020603050405020304" pitchFamily="18" charset="0"/>
+                        </a:rPr>
+                        <a:t>Moteur</a:t>
+                      </a:r>
+                    </a:p>
+                  </a:txBody>
+                  <a:tcPr marL="68580" marR="68580" marT="0" marB="0"/>
+                </a:tc>
+                <a:tc>
+                  <a:txBody>
+                    <a:bodyPr/>
+                    <a:lstStyle/>
+                    <a:p>
+                      <a:pPr>
+                        <a:lnSpc>
+                          <a:spcPct val="107000"/>
+                        </a:lnSpc>
+                        <a:spcAft>
+                          <a:spcPts val="0"/>
+                        </a:spcAft>
+                      </a:pPr>
+                      <a:r>
+                        <a:rPr lang="fr-FR" sz="1100" dirty="0">
+                          <a:effectLst/>
+                          <a:latin typeface="+mn-lt"/>
+                          <a:ea typeface="Calibri" panose="020F0502020204030204" pitchFamily="34" charset="0"/>
+                          <a:cs typeface="Times New Roman" panose="02020603050405020304" pitchFamily="18" charset="0"/>
+                        </a:rPr>
+                        <a:t>FP4.1</a:t>
+                      </a:r>
+                    </a:p>
+                  </a:txBody>
+                  <a:tcPr marL="68580" marR="68580" marT="0" marB="0"/>
+                </a:tc>
+                <a:tc>
+                  <a:txBody>
+                    <a:bodyPr/>
+                    <a:lstStyle/>
+                    <a:p>
+                      <a:pPr>
+                        <a:lnSpc>
+                          <a:spcPct val="107000"/>
+                        </a:lnSpc>
+                        <a:spcAft>
+                          <a:spcPts val="0"/>
+                        </a:spcAft>
+                      </a:pPr>
+                      <a:r>
+                        <a:rPr lang="fr-FR" sz="1100" dirty="0">
+                          <a:effectLst/>
+                          <a:latin typeface="+mn-lt"/>
+                          <a:ea typeface="Calibri" panose="020F0502020204030204" pitchFamily="34" charset="0"/>
+                          <a:cs typeface="Times New Roman" panose="02020603050405020304" pitchFamily="18" charset="0"/>
+                        </a:rPr>
+                        <a:t>Cylindrée</a:t>
+                      </a:r>
+                    </a:p>
+                  </a:txBody>
+                  <a:tcPr marL="68580" marR="68580" marT="0" marB="0"/>
+                </a:tc>
+                <a:tc>
+                  <a:txBody>
+                    <a:bodyPr/>
+                    <a:lstStyle/>
+                    <a:p>
+                      <a:pPr>
+                        <a:lnSpc>
+                          <a:spcPct val="107000"/>
+                        </a:lnSpc>
+                        <a:spcAft>
+                          <a:spcPts val="0"/>
+                        </a:spcAft>
+                      </a:pPr>
+                      <a:r>
+                        <a:rPr lang="fr-FR" sz="1100" dirty="0">
+                          <a:effectLst/>
+                          <a:latin typeface="+mn-lt"/>
+                        </a:rPr>
+                        <a:t> </a:t>
+                      </a:r>
+                      <a:endParaRPr lang="fr-FR" sz="1100" dirty="0">
+                        <a:effectLst/>
+                        <a:latin typeface="+mn-lt"/>
+                        <a:ea typeface="Calibri" panose="020F0502020204030204" pitchFamily="34" charset="0"/>
+                        <a:cs typeface="Times New Roman" panose="02020603050405020304" pitchFamily="18" charset="0"/>
+                      </a:endParaRPr>
+                    </a:p>
+                  </a:txBody>
+                  <a:tcPr marL="68580" marR="68580" marT="0" marB="0"/>
+                </a:tc>
+                <a:tc>
+                  <a:txBody>
+                    <a:bodyPr/>
+                    <a:lstStyle/>
+                    <a:p>
+                      <a:pPr>
+                        <a:lnSpc>
+                          <a:spcPct val="107000"/>
+                        </a:lnSpc>
+                        <a:spcAft>
+                          <a:spcPts val="0"/>
+                        </a:spcAft>
+                      </a:pPr>
+                      <a:r>
+                        <a:rPr lang="fr-FR" sz="1100" dirty="0">
+                          <a:effectLst/>
+                          <a:latin typeface="+mn-lt"/>
+                        </a:rPr>
+                        <a:t> </a:t>
+                      </a:r>
+                      <a:endParaRPr lang="fr-FR" sz="1100" dirty="0">
+                        <a:effectLst/>
+                        <a:latin typeface="+mn-lt"/>
+                        <a:ea typeface="Calibri" panose="020F0502020204030204" pitchFamily="34" charset="0"/>
+                        <a:cs typeface="Times New Roman" panose="02020603050405020304" pitchFamily="18" charset="0"/>
+                      </a:endParaRPr>
+                    </a:p>
+                  </a:txBody>
+                  <a:tcPr marL="68580" marR="68580" marT="0" marB="0"/>
+                </a:tc>
+                <a:tc>
+                  <a:txBody>
+                    <a:bodyPr/>
+                    <a:lstStyle/>
+                    <a:p>
+                      <a:pPr>
+                        <a:lnSpc>
+                          <a:spcPct val="107000"/>
+                        </a:lnSpc>
+                        <a:spcAft>
+                          <a:spcPts val="0"/>
+                        </a:spcAft>
+                      </a:pPr>
+                      <a:r>
+                        <a:rPr lang="fr-FR" sz="1100" dirty="0">
+                          <a:effectLst/>
+                          <a:latin typeface="+mn-lt"/>
+                        </a:rPr>
+                        <a:t> </a:t>
+                      </a:r>
+                      <a:endParaRPr lang="fr-FR" sz="1100" dirty="0">
+                        <a:effectLst/>
+                        <a:latin typeface="+mn-lt"/>
+                        <a:ea typeface="Calibri" panose="020F0502020204030204" pitchFamily="34" charset="0"/>
+                        <a:cs typeface="Times New Roman" panose="02020603050405020304" pitchFamily="18" charset="0"/>
+                      </a:endParaRPr>
+                    </a:p>
+                  </a:txBody>
+                  <a:tcPr marL="68580" marR="68580" marT="0" marB="0"/>
+                </a:tc>
+                <a:extLst>
+                  <a:ext uri="{0D108BD9-81ED-4DB2-BD59-A6C34878D82A}">
+                    <a16:rowId xmlns:a16="http://schemas.microsoft.com/office/drawing/2014/main" val="1092317298"/>
+                  </a:ext>
+                </a:extLst>
+              </a:tr>
+              <a:tr h="187071">
+                <a:tc vMerge="1">
+                  <a:txBody>
+                    <a:bodyPr/>
+                    <a:lstStyle/>
+                    <a:p>
+                      <a:pPr>
+                        <a:lnSpc>
+                          <a:spcPct val="107000"/>
+                        </a:lnSpc>
+                        <a:spcAft>
+                          <a:spcPts val="0"/>
+                        </a:spcAft>
+                      </a:pPr>
+                      <a:endParaRPr lang="fr-FR" sz="1100" dirty="0">
+                        <a:effectLst/>
+                        <a:latin typeface="+mn-lt"/>
+                        <a:ea typeface="Calibri" panose="020F0502020204030204" pitchFamily="34" charset="0"/>
+                        <a:cs typeface="Times New Roman" panose="02020603050405020304" pitchFamily="18" charset="0"/>
+                      </a:endParaRPr>
+                    </a:p>
+                  </a:txBody>
+                  <a:tcPr marL="68580" marR="68580" marT="0" marB="0"/>
+                </a:tc>
+                <a:tc vMerge="1">
+                  <a:txBody>
+                    <a:bodyPr/>
+                    <a:lstStyle/>
+                    <a:p>
+                      <a:pPr>
+                        <a:lnSpc>
+                          <a:spcPct val="107000"/>
+                        </a:lnSpc>
+                        <a:spcAft>
+                          <a:spcPts val="0"/>
+                        </a:spcAft>
+                      </a:pPr>
+                      <a:endParaRPr lang="fr-FR" sz="1100" dirty="0">
+                        <a:effectLst/>
+                        <a:latin typeface="+mn-lt"/>
+                        <a:ea typeface="Calibri" panose="020F0502020204030204" pitchFamily="34" charset="0"/>
+                        <a:cs typeface="Times New Roman" panose="02020603050405020304" pitchFamily="18" charset="0"/>
+                      </a:endParaRPr>
+                    </a:p>
+                  </a:txBody>
+                  <a:tcPr marL="68580" marR="68580" marT="0" marB="0"/>
+                </a:tc>
+                <a:tc>
+                  <a:txBody>
+                    <a:bodyPr/>
+                    <a:lstStyle/>
+                    <a:p>
+                      <a:pPr>
+                        <a:lnSpc>
+                          <a:spcPct val="107000"/>
+                        </a:lnSpc>
+                        <a:spcAft>
+                          <a:spcPts val="0"/>
+                        </a:spcAft>
+                      </a:pPr>
+                      <a:r>
+                        <a:rPr lang="fr-FR" sz="1100" dirty="0">
+                          <a:effectLst/>
+                          <a:latin typeface="+mn-lt"/>
+                          <a:ea typeface="Calibri" panose="020F0502020204030204" pitchFamily="34" charset="0"/>
+                          <a:cs typeface="Times New Roman" panose="02020603050405020304" pitchFamily="18" charset="0"/>
+                        </a:rPr>
+                        <a:t>FP4.2</a:t>
+                      </a:r>
+                    </a:p>
+                  </a:txBody>
+                  <a:tcPr marL="68580" marR="68580" marT="0" marB="0"/>
+                </a:tc>
+                <a:tc>
+                  <a:txBody>
+                    <a:bodyPr/>
+                    <a:lstStyle/>
+                    <a:p>
+                      <a:pPr>
+                        <a:lnSpc>
+                          <a:spcPct val="107000"/>
+                        </a:lnSpc>
+                        <a:spcAft>
+                          <a:spcPts val="0"/>
+                        </a:spcAft>
+                      </a:pPr>
+                      <a:r>
+                        <a:rPr lang="fr-FR" sz="1100" dirty="0">
+                          <a:effectLst/>
+                          <a:latin typeface="+mn-lt"/>
+                          <a:ea typeface="Calibri" panose="020F0502020204030204" pitchFamily="34" charset="0"/>
+                          <a:cs typeface="Times New Roman" panose="02020603050405020304" pitchFamily="18" charset="0"/>
+                        </a:rPr>
+                        <a:t>Puissance maximale</a:t>
+                      </a:r>
+                    </a:p>
+                  </a:txBody>
+                  <a:tcPr marL="68580" marR="68580" marT="0" marB="0"/>
+                </a:tc>
+                <a:tc>
+                  <a:txBody>
+                    <a:bodyPr/>
+                    <a:lstStyle/>
+                    <a:p>
+                      <a:pPr>
+                        <a:lnSpc>
+                          <a:spcPct val="107000"/>
+                        </a:lnSpc>
+                        <a:spcAft>
+                          <a:spcPts val="0"/>
+                        </a:spcAft>
+                      </a:pPr>
+                      <a:r>
+                        <a:rPr lang="fr-FR" sz="1100">
+                          <a:effectLst/>
+                          <a:latin typeface="+mn-lt"/>
+                        </a:rPr>
+                        <a:t> </a:t>
+                      </a:r>
+                      <a:endParaRPr lang="fr-FR" sz="1100">
+                        <a:effectLst/>
+                        <a:latin typeface="+mn-lt"/>
+                        <a:ea typeface="Calibri" panose="020F0502020204030204" pitchFamily="34" charset="0"/>
+                        <a:cs typeface="Times New Roman" panose="02020603050405020304" pitchFamily="18" charset="0"/>
+                      </a:endParaRPr>
+                    </a:p>
+                  </a:txBody>
+                  <a:tcPr marL="68580" marR="68580" marT="0" marB="0"/>
+                </a:tc>
+                <a:tc>
+                  <a:txBody>
+                    <a:bodyPr/>
+                    <a:lstStyle/>
+                    <a:p>
+                      <a:pPr>
+                        <a:lnSpc>
+                          <a:spcPct val="107000"/>
+                        </a:lnSpc>
+                        <a:spcAft>
+                          <a:spcPts val="0"/>
+                        </a:spcAft>
+                      </a:pPr>
+                      <a:r>
+                        <a:rPr lang="fr-FR" sz="1100">
+                          <a:effectLst/>
+                          <a:latin typeface="+mn-lt"/>
+                        </a:rPr>
+                        <a:t> </a:t>
+                      </a:r>
+                      <a:endParaRPr lang="fr-FR" sz="1100">
+                        <a:effectLst/>
+                        <a:latin typeface="+mn-lt"/>
+                        <a:ea typeface="Calibri" panose="020F0502020204030204" pitchFamily="34" charset="0"/>
+                        <a:cs typeface="Times New Roman" panose="02020603050405020304" pitchFamily="18" charset="0"/>
+                      </a:endParaRPr>
+                    </a:p>
+                  </a:txBody>
+                  <a:tcPr marL="68580" marR="68580" marT="0" marB="0"/>
+                </a:tc>
+                <a:tc>
+                  <a:txBody>
+                    <a:bodyPr/>
+                    <a:lstStyle/>
+                    <a:p>
+                      <a:pPr>
+                        <a:lnSpc>
+                          <a:spcPct val="107000"/>
+                        </a:lnSpc>
+                        <a:spcAft>
+                          <a:spcPts val="0"/>
+                        </a:spcAft>
+                      </a:pPr>
+                      <a:r>
+                        <a:rPr lang="fr-FR" sz="1100" dirty="0">
+                          <a:effectLst/>
+                          <a:latin typeface="+mn-lt"/>
+                        </a:rPr>
+                        <a:t> </a:t>
+                      </a:r>
+                      <a:endParaRPr lang="fr-FR" sz="1100" dirty="0">
+                        <a:effectLst/>
+                        <a:latin typeface="+mn-lt"/>
+                        <a:ea typeface="Calibri" panose="020F0502020204030204" pitchFamily="34" charset="0"/>
+                        <a:cs typeface="Times New Roman" panose="02020603050405020304" pitchFamily="18" charset="0"/>
+                      </a:endParaRPr>
+                    </a:p>
+                  </a:txBody>
+                  <a:tcPr marL="68580" marR="68580" marT="0" marB="0"/>
+                </a:tc>
+                <a:extLst>
+                  <a:ext uri="{0D108BD9-81ED-4DB2-BD59-A6C34878D82A}">
+                    <a16:rowId xmlns:a16="http://schemas.microsoft.com/office/drawing/2014/main" val="1582138609"/>
+                  </a:ext>
+                </a:extLst>
+              </a:tr>
+              <a:tr h="187071">
+                <a:tc vMerge="1">
+                  <a:txBody>
+                    <a:bodyPr/>
+                    <a:lstStyle/>
+                    <a:p>
+                      <a:pPr>
+                        <a:lnSpc>
+                          <a:spcPct val="107000"/>
+                        </a:lnSpc>
+                        <a:spcAft>
+                          <a:spcPts val="0"/>
+                        </a:spcAft>
+                      </a:pPr>
+                      <a:endParaRPr lang="fr-FR" sz="1100" dirty="0">
+                        <a:effectLst/>
+                        <a:latin typeface="+mn-lt"/>
+                        <a:ea typeface="Calibri" panose="020F0502020204030204" pitchFamily="34" charset="0"/>
+                        <a:cs typeface="Times New Roman" panose="02020603050405020304" pitchFamily="18" charset="0"/>
+                      </a:endParaRPr>
+                    </a:p>
+                  </a:txBody>
+                  <a:tcPr marL="68580" marR="68580" marT="0" marB="0"/>
+                </a:tc>
+                <a:tc vMerge="1">
+                  <a:txBody>
+                    <a:bodyPr/>
+                    <a:lstStyle/>
+                    <a:p>
+                      <a:pPr>
+                        <a:lnSpc>
+                          <a:spcPct val="107000"/>
+                        </a:lnSpc>
+                        <a:spcAft>
+                          <a:spcPts val="0"/>
+                        </a:spcAft>
+                      </a:pPr>
+                      <a:endParaRPr lang="fr-FR" sz="1100" dirty="0">
+                        <a:effectLst/>
+                        <a:latin typeface="+mn-lt"/>
+                        <a:ea typeface="Calibri" panose="020F0502020204030204" pitchFamily="34" charset="0"/>
+                        <a:cs typeface="Times New Roman" panose="02020603050405020304" pitchFamily="18" charset="0"/>
+                      </a:endParaRPr>
+                    </a:p>
+                  </a:txBody>
+                  <a:tcPr marL="68580" marR="68580" marT="0" marB="0"/>
+                </a:tc>
+                <a:tc>
+                  <a:txBody>
+                    <a:bodyPr/>
+                    <a:lstStyle/>
+                    <a:p>
+                      <a:pPr>
+                        <a:lnSpc>
+                          <a:spcPct val="107000"/>
+                        </a:lnSpc>
+                        <a:spcAft>
+                          <a:spcPts val="0"/>
+                        </a:spcAft>
+                      </a:pPr>
+                      <a:r>
+                        <a:rPr lang="fr-FR" sz="1100" dirty="0">
+                          <a:effectLst/>
+                          <a:latin typeface="+mn-lt"/>
+                          <a:ea typeface="Calibri" panose="020F0502020204030204" pitchFamily="34" charset="0"/>
+                          <a:cs typeface="Times New Roman" panose="02020603050405020304" pitchFamily="18" charset="0"/>
+                        </a:rPr>
+                        <a:t>FP4.3</a:t>
+                      </a:r>
+                    </a:p>
+                  </a:txBody>
+                  <a:tcPr marL="68580" marR="68580" marT="0" marB="0"/>
+                </a:tc>
+                <a:tc>
+                  <a:txBody>
+                    <a:bodyPr/>
+                    <a:lstStyle/>
+                    <a:p>
+                      <a:pPr>
+                        <a:lnSpc>
+                          <a:spcPct val="107000"/>
+                        </a:lnSpc>
+                        <a:spcAft>
+                          <a:spcPts val="0"/>
+                        </a:spcAft>
+                      </a:pPr>
+                      <a:r>
+                        <a:rPr lang="fr-FR" sz="1100" dirty="0">
+                          <a:effectLst/>
+                          <a:latin typeface="+mn-lt"/>
+                          <a:ea typeface="Calibri" panose="020F0502020204030204" pitchFamily="34" charset="0"/>
+                          <a:cs typeface="Times New Roman" panose="02020603050405020304" pitchFamily="18" charset="0"/>
+                        </a:rPr>
+                        <a:t>Couple maximal</a:t>
+                      </a:r>
+                    </a:p>
+                  </a:txBody>
+                  <a:tcPr marL="68580" marR="68580" marT="0" marB="0"/>
+                </a:tc>
+                <a:tc>
+                  <a:txBody>
+                    <a:bodyPr/>
+                    <a:lstStyle/>
+                    <a:p>
+                      <a:pPr>
+                        <a:lnSpc>
+                          <a:spcPct val="107000"/>
+                        </a:lnSpc>
+                        <a:spcAft>
+                          <a:spcPts val="0"/>
+                        </a:spcAft>
+                      </a:pPr>
+                      <a:r>
+                        <a:rPr lang="fr-FR" sz="1100">
+                          <a:effectLst/>
+                          <a:latin typeface="+mn-lt"/>
+                        </a:rPr>
+                        <a:t> </a:t>
+                      </a:r>
+                      <a:endParaRPr lang="fr-FR" sz="1100">
+                        <a:effectLst/>
+                        <a:latin typeface="+mn-lt"/>
+                        <a:ea typeface="Calibri" panose="020F0502020204030204" pitchFamily="34" charset="0"/>
+                        <a:cs typeface="Times New Roman" panose="02020603050405020304" pitchFamily="18" charset="0"/>
+                      </a:endParaRPr>
+                    </a:p>
+                  </a:txBody>
+                  <a:tcPr marL="68580" marR="68580" marT="0" marB="0"/>
+                </a:tc>
+                <a:tc>
+                  <a:txBody>
+                    <a:bodyPr/>
+                    <a:lstStyle/>
+                    <a:p>
+                      <a:pPr>
+                        <a:lnSpc>
+                          <a:spcPct val="107000"/>
+                        </a:lnSpc>
+                        <a:spcAft>
+                          <a:spcPts val="0"/>
+                        </a:spcAft>
+                      </a:pPr>
+                      <a:r>
+                        <a:rPr lang="fr-FR" sz="1100">
+                          <a:effectLst/>
+                          <a:latin typeface="+mn-lt"/>
+                        </a:rPr>
+                        <a:t> </a:t>
+                      </a:r>
+                      <a:endParaRPr lang="fr-FR" sz="1100">
+                        <a:effectLst/>
+                        <a:latin typeface="+mn-lt"/>
+                        <a:ea typeface="Calibri" panose="020F0502020204030204" pitchFamily="34" charset="0"/>
+                        <a:cs typeface="Times New Roman" panose="02020603050405020304" pitchFamily="18" charset="0"/>
+                      </a:endParaRPr>
+                    </a:p>
+                  </a:txBody>
+                  <a:tcPr marL="68580" marR="68580" marT="0" marB="0"/>
+                </a:tc>
+                <a:tc>
+                  <a:txBody>
+                    <a:bodyPr/>
+                    <a:lstStyle/>
+                    <a:p>
+                      <a:pPr>
+                        <a:lnSpc>
+                          <a:spcPct val="107000"/>
+                        </a:lnSpc>
+                        <a:spcAft>
+                          <a:spcPts val="0"/>
+                        </a:spcAft>
+                      </a:pPr>
+                      <a:r>
+                        <a:rPr lang="fr-FR" sz="1100">
+                          <a:effectLst/>
+                          <a:latin typeface="+mn-lt"/>
+                        </a:rPr>
+                        <a:t> </a:t>
+                      </a:r>
+                      <a:endParaRPr lang="fr-FR" sz="1100">
+                        <a:effectLst/>
+                        <a:latin typeface="+mn-lt"/>
+                        <a:ea typeface="Calibri" panose="020F0502020204030204" pitchFamily="34" charset="0"/>
+                        <a:cs typeface="Times New Roman" panose="02020603050405020304" pitchFamily="18" charset="0"/>
+                      </a:endParaRPr>
+                    </a:p>
+                  </a:txBody>
+                  <a:tcPr marL="68580" marR="68580" marT="0" marB="0"/>
+                </a:tc>
+                <a:extLst>
+                  <a:ext uri="{0D108BD9-81ED-4DB2-BD59-A6C34878D82A}">
+                    <a16:rowId xmlns:a16="http://schemas.microsoft.com/office/drawing/2014/main" val="3474703214"/>
+                  </a:ext>
+                </a:extLst>
+              </a:tr>
+              <a:tr h="187071">
+                <a:tc vMerge="1">
+                  <a:txBody>
+                    <a:bodyPr/>
+                    <a:lstStyle/>
+                    <a:p>
+                      <a:pPr>
+                        <a:lnSpc>
+                          <a:spcPct val="107000"/>
+                        </a:lnSpc>
+                        <a:spcAft>
+                          <a:spcPts val="0"/>
+                        </a:spcAft>
+                      </a:pPr>
+                      <a:endParaRPr lang="fr-FR" sz="1100" dirty="0">
+                        <a:effectLst/>
+                        <a:latin typeface="+mn-lt"/>
+                        <a:ea typeface="Calibri" panose="020F0502020204030204" pitchFamily="34" charset="0"/>
+                        <a:cs typeface="Times New Roman" panose="02020603050405020304" pitchFamily="18" charset="0"/>
+                      </a:endParaRPr>
+                    </a:p>
+                  </a:txBody>
+                  <a:tcPr marL="68580" marR="68580" marT="0" marB="0"/>
+                </a:tc>
+                <a:tc vMerge="1">
+                  <a:txBody>
+                    <a:bodyPr/>
+                    <a:lstStyle/>
+                    <a:p>
+                      <a:pPr>
+                        <a:lnSpc>
+                          <a:spcPct val="107000"/>
+                        </a:lnSpc>
+                        <a:spcAft>
+                          <a:spcPts val="0"/>
+                        </a:spcAft>
+                      </a:pPr>
+                      <a:endParaRPr lang="fr-FR" sz="1100" dirty="0">
+                        <a:effectLst/>
+                        <a:latin typeface="+mn-lt"/>
+                      </a:endParaRPr>
+                    </a:p>
+                  </a:txBody>
+                  <a:tcPr marL="68580" marR="68580" marT="0" marB="0"/>
+                </a:tc>
+                <a:tc>
+                  <a:txBody>
+                    <a:bodyPr/>
+                    <a:lstStyle/>
+                    <a:p>
+                      <a:pPr>
+                        <a:lnSpc>
+                          <a:spcPct val="107000"/>
+                        </a:lnSpc>
+                        <a:spcAft>
+                          <a:spcPts val="0"/>
+                        </a:spcAft>
+                      </a:pPr>
+                      <a:r>
+                        <a:rPr lang="fr-FR" sz="1100" dirty="0">
+                          <a:effectLst/>
+                          <a:latin typeface="+mn-lt"/>
+                          <a:ea typeface="Calibri" panose="020F0502020204030204" pitchFamily="34" charset="0"/>
+                          <a:cs typeface="Times New Roman" panose="02020603050405020304" pitchFamily="18" charset="0"/>
+                        </a:rPr>
+                        <a:t>FP4.4</a:t>
+                      </a:r>
+                    </a:p>
+                  </a:txBody>
+                  <a:tcPr marL="68580" marR="68580" marT="0" marB="0"/>
+                </a:tc>
+                <a:tc>
+                  <a:txBody>
+                    <a:bodyPr/>
+                    <a:lstStyle/>
+                    <a:p>
+                      <a:pPr>
+                        <a:lnSpc>
+                          <a:spcPct val="107000"/>
+                        </a:lnSpc>
+                        <a:spcAft>
+                          <a:spcPts val="0"/>
+                        </a:spcAft>
+                      </a:pPr>
+                      <a:r>
+                        <a:rPr lang="fr-FR" sz="1100" dirty="0">
+                          <a:effectLst/>
+                          <a:latin typeface="+mn-lt"/>
+                          <a:ea typeface="Calibri" panose="020F0502020204030204" pitchFamily="34" charset="0"/>
+                          <a:cs typeface="Times New Roman" panose="02020603050405020304" pitchFamily="18" charset="0"/>
+                        </a:rPr>
+                        <a:t>Rapport poids puissance</a:t>
+                      </a:r>
+                    </a:p>
+                  </a:txBody>
+                  <a:tcPr marL="68580" marR="68580" marT="0" marB="0"/>
+                </a:tc>
+                <a:tc>
+                  <a:txBody>
+                    <a:bodyPr/>
+                    <a:lstStyle/>
+                    <a:p>
+                      <a:pPr>
+                        <a:lnSpc>
+                          <a:spcPct val="107000"/>
+                        </a:lnSpc>
+                        <a:spcAft>
+                          <a:spcPts val="0"/>
+                        </a:spcAft>
+                      </a:pPr>
+                      <a:r>
+                        <a:rPr lang="fr-FR" sz="1100">
+                          <a:effectLst/>
+                          <a:latin typeface="+mn-lt"/>
+                        </a:rPr>
+                        <a:t> </a:t>
+                      </a:r>
+                      <a:endParaRPr lang="fr-FR" sz="1100">
+                        <a:effectLst/>
+                        <a:latin typeface="+mn-lt"/>
+                        <a:ea typeface="Calibri" panose="020F0502020204030204" pitchFamily="34" charset="0"/>
+                        <a:cs typeface="Times New Roman" panose="02020603050405020304" pitchFamily="18" charset="0"/>
+                      </a:endParaRPr>
+                    </a:p>
+                  </a:txBody>
+                  <a:tcPr marL="68580" marR="68580" marT="0" marB="0"/>
+                </a:tc>
+                <a:tc>
+                  <a:txBody>
+                    <a:bodyPr/>
+                    <a:lstStyle/>
+                    <a:p>
+                      <a:pPr>
+                        <a:lnSpc>
+                          <a:spcPct val="107000"/>
+                        </a:lnSpc>
+                        <a:spcAft>
+                          <a:spcPts val="0"/>
+                        </a:spcAft>
+                      </a:pPr>
+                      <a:r>
+                        <a:rPr lang="fr-FR" sz="1100">
+                          <a:effectLst/>
+                          <a:latin typeface="+mn-lt"/>
+                        </a:rPr>
+                        <a:t> </a:t>
+                      </a:r>
+                      <a:endParaRPr lang="fr-FR" sz="1100">
+                        <a:effectLst/>
+                        <a:latin typeface="+mn-lt"/>
+                        <a:ea typeface="Calibri" panose="020F0502020204030204" pitchFamily="34" charset="0"/>
+                        <a:cs typeface="Times New Roman" panose="02020603050405020304" pitchFamily="18" charset="0"/>
+                      </a:endParaRPr>
+                    </a:p>
+                  </a:txBody>
+                  <a:tcPr marL="68580" marR="68580" marT="0" marB="0"/>
+                </a:tc>
+                <a:tc>
+                  <a:txBody>
+                    <a:bodyPr/>
+                    <a:lstStyle/>
+                    <a:p>
+                      <a:pPr>
+                        <a:lnSpc>
+                          <a:spcPct val="107000"/>
+                        </a:lnSpc>
+                        <a:spcAft>
+                          <a:spcPts val="0"/>
+                        </a:spcAft>
+                      </a:pPr>
+                      <a:r>
+                        <a:rPr lang="fr-FR" sz="1100">
+                          <a:effectLst/>
+                          <a:latin typeface="+mn-lt"/>
+                        </a:rPr>
+                        <a:t> </a:t>
+                      </a:r>
+                      <a:endParaRPr lang="fr-FR" sz="1100">
+                        <a:effectLst/>
+                        <a:latin typeface="+mn-lt"/>
+                        <a:ea typeface="Calibri" panose="020F0502020204030204" pitchFamily="34" charset="0"/>
+                        <a:cs typeface="Times New Roman" panose="02020603050405020304" pitchFamily="18" charset="0"/>
+                      </a:endParaRPr>
+                    </a:p>
+                  </a:txBody>
+                  <a:tcPr marL="68580" marR="68580" marT="0" marB="0"/>
+                </a:tc>
+                <a:extLst>
+                  <a:ext uri="{0D108BD9-81ED-4DB2-BD59-A6C34878D82A}">
+                    <a16:rowId xmlns:a16="http://schemas.microsoft.com/office/drawing/2014/main" val="298196809"/>
+                  </a:ext>
+                </a:extLst>
+              </a:tr>
+              <a:tr h="187071">
+                <a:tc rowSpan="4">
+                  <a:txBody>
+                    <a:bodyPr/>
+                    <a:lstStyle/>
+                    <a:p>
+                      <a:pPr>
+                        <a:lnSpc>
+                          <a:spcPct val="107000"/>
+                        </a:lnSpc>
+                        <a:spcAft>
+                          <a:spcPts val="0"/>
+                        </a:spcAft>
+                      </a:pPr>
+                      <a:r>
+                        <a:rPr lang="fr-FR" sz="1100" dirty="0">
+                          <a:effectLst/>
+                          <a:latin typeface="+mn-lt"/>
+                          <a:ea typeface="Calibri" panose="020F0502020204030204" pitchFamily="34" charset="0"/>
+                          <a:cs typeface="Times New Roman" panose="02020603050405020304" pitchFamily="18" charset="0"/>
+                        </a:rPr>
+                        <a:t>FP5</a:t>
+                      </a:r>
+                    </a:p>
+                  </a:txBody>
+                  <a:tcPr marL="68580" marR="68580" marT="0" marB="0"/>
+                </a:tc>
+                <a:tc rowSpan="4">
+                  <a:txBody>
+                    <a:bodyPr/>
+                    <a:lstStyle/>
+                    <a:p>
+                      <a:pPr>
+                        <a:lnSpc>
+                          <a:spcPct val="107000"/>
+                        </a:lnSpc>
+                        <a:spcAft>
+                          <a:spcPts val="0"/>
+                        </a:spcAft>
+                      </a:pPr>
+                      <a:r>
+                        <a:rPr lang="fr-FR" sz="1100" dirty="0">
+                          <a:effectLst/>
+                          <a:latin typeface="+mn-lt"/>
+                          <a:ea typeface="Calibri" panose="020F0502020204030204" pitchFamily="34" charset="0"/>
+                          <a:cs typeface="Times New Roman" panose="02020603050405020304" pitchFamily="18" charset="0"/>
+                        </a:rPr>
+                        <a:t>Dimensions</a:t>
+                      </a:r>
+                    </a:p>
+                  </a:txBody>
+                  <a:tcPr marL="68580" marR="68580" marT="0" marB="0"/>
+                </a:tc>
+                <a:tc>
+                  <a:txBody>
+                    <a:bodyPr/>
+                    <a:lstStyle/>
+                    <a:p>
+                      <a:pPr>
+                        <a:lnSpc>
+                          <a:spcPct val="107000"/>
+                        </a:lnSpc>
+                        <a:spcAft>
+                          <a:spcPts val="0"/>
+                        </a:spcAft>
+                      </a:pPr>
+                      <a:r>
+                        <a:rPr lang="fr-FR" sz="1100" dirty="0">
+                          <a:effectLst/>
+                          <a:latin typeface="+mn-lt"/>
+                          <a:ea typeface="Calibri" panose="020F0502020204030204" pitchFamily="34" charset="0"/>
+                          <a:cs typeface="Times New Roman" panose="02020603050405020304" pitchFamily="18" charset="0"/>
+                        </a:rPr>
+                        <a:t>FP5.1</a:t>
+                      </a:r>
+                    </a:p>
+                  </a:txBody>
+                  <a:tcPr marL="68580" marR="68580" marT="0" marB="0"/>
+                </a:tc>
+                <a:tc>
+                  <a:txBody>
+                    <a:bodyPr/>
+                    <a:lstStyle/>
+                    <a:p>
+                      <a:pPr>
+                        <a:lnSpc>
+                          <a:spcPct val="107000"/>
+                        </a:lnSpc>
+                        <a:spcAft>
+                          <a:spcPts val="0"/>
+                        </a:spcAft>
+                      </a:pPr>
+                      <a:r>
+                        <a:rPr lang="fr-FR" sz="1100" dirty="0">
+                          <a:effectLst/>
+                          <a:latin typeface="+mn-lt"/>
+                          <a:ea typeface="Calibri" panose="020F0502020204030204" pitchFamily="34" charset="0"/>
+                          <a:cs typeface="Times New Roman" panose="02020603050405020304" pitchFamily="18" charset="0"/>
+                        </a:rPr>
+                        <a:t>Centre de gravité</a:t>
+                      </a:r>
+                    </a:p>
+                  </a:txBody>
+                  <a:tcPr marL="68580" marR="68580" marT="0" marB="0"/>
+                </a:tc>
+                <a:tc>
+                  <a:txBody>
+                    <a:bodyPr/>
+                    <a:lstStyle/>
+                    <a:p>
+                      <a:pPr>
+                        <a:lnSpc>
+                          <a:spcPct val="107000"/>
+                        </a:lnSpc>
+                        <a:spcAft>
+                          <a:spcPts val="0"/>
+                        </a:spcAft>
+                      </a:pPr>
+                      <a:r>
+                        <a:rPr lang="fr-FR" sz="1100">
+                          <a:effectLst/>
+                          <a:latin typeface="+mn-lt"/>
+                        </a:rPr>
+                        <a:t> </a:t>
+                      </a:r>
+                      <a:endParaRPr lang="fr-FR" sz="1100">
+                        <a:effectLst/>
+                        <a:latin typeface="+mn-lt"/>
+                        <a:ea typeface="Calibri" panose="020F0502020204030204" pitchFamily="34" charset="0"/>
+                        <a:cs typeface="Times New Roman" panose="02020603050405020304" pitchFamily="18" charset="0"/>
+                      </a:endParaRPr>
+                    </a:p>
+                  </a:txBody>
+                  <a:tcPr marL="68580" marR="68580" marT="0" marB="0"/>
+                </a:tc>
+                <a:tc>
+                  <a:txBody>
+                    <a:bodyPr/>
+                    <a:lstStyle/>
+                    <a:p>
+                      <a:pPr>
+                        <a:lnSpc>
+                          <a:spcPct val="107000"/>
+                        </a:lnSpc>
+                        <a:spcAft>
+                          <a:spcPts val="0"/>
+                        </a:spcAft>
+                      </a:pPr>
+                      <a:r>
+                        <a:rPr lang="fr-FR" sz="1100">
+                          <a:effectLst/>
+                          <a:latin typeface="+mn-lt"/>
+                        </a:rPr>
+                        <a:t> </a:t>
+                      </a:r>
+                      <a:endParaRPr lang="fr-FR" sz="1100">
+                        <a:effectLst/>
+                        <a:latin typeface="+mn-lt"/>
+                        <a:ea typeface="Calibri" panose="020F0502020204030204" pitchFamily="34" charset="0"/>
+                        <a:cs typeface="Times New Roman" panose="02020603050405020304" pitchFamily="18" charset="0"/>
+                      </a:endParaRPr>
+                    </a:p>
+                  </a:txBody>
+                  <a:tcPr marL="68580" marR="68580" marT="0" marB="0"/>
+                </a:tc>
+                <a:tc>
+                  <a:txBody>
+                    <a:bodyPr/>
+                    <a:lstStyle/>
+                    <a:p>
+                      <a:pPr>
+                        <a:lnSpc>
+                          <a:spcPct val="107000"/>
+                        </a:lnSpc>
+                        <a:spcAft>
+                          <a:spcPts val="0"/>
+                        </a:spcAft>
+                      </a:pPr>
+                      <a:r>
+                        <a:rPr lang="fr-FR" sz="1100" dirty="0">
+                          <a:effectLst/>
+                          <a:latin typeface="+mn-lt"/>
+                        </a:rPr>
+                        <a:t> </a:t>
+                      </a:r>
+                      <a:endParaRPr lang="fr-FR" sz="1100" dirty="0">
+                        <a:effectLst/>
+                        <a:latin typeface="+mn-lt"/>
+                        <a:ea typeface="Calibri" panose="020F0502020204030204" pitchFamily="34" charset="0"/>
+                        <a:cs typeface="Times New Roman" panose="02020603050405020304" pitchFamily="18" charset="0"/>
+                      </a:endParaRPr>
+                    </a:p>
+                  </a:txBody>
+                  <a:tcPr marL="68580" marR="68580" marT="0" marB="0"/>
+                </a:tc>
+                <a:extLst>
+                  <a:ext uri="{0D108BD9-81ED-4DB2-BD59-A6C34878D82A}">
+                    <a16:rowId xmlns:a16="http://schemas.microsoft.com/office/drawing/2014/main" val="55608268"/>
+                  </a:ext>
+                </a:extLst>
+              </a:tr>
+              <a:tr h="187071">
+                <a:tc vMerge="1">
+                  <a:txBody>
+                    <a:bodyPr/>
+                    <a:lstStyle/>
+                    <a:p>
+                      <a:pPr>
+                        <a:lnSpc>
+                          <a:spcPct val="107000"/>
+                        </a:lnSpc>
+                        <a:spcAft>
+                          <a:spcPts val="0"/>
+                        </a:spcAft>
+                      </a:pPr>
+                      <a:endParaRPr lang="fr-FR" sz="1100" dirty="0">
+                        <a:effectLst/>
+                        <a:latin typeface="+mn-lt"/>
+                        <a:ea typeface="Calibri" panose="020F0502020204030204" pitchFamily="34" charset="0"/>
+                        <a:cs typeface="Times New Roman" panose="02020603050405020304" pitchFamily="18" charset="0"/>
+                      </a:endParaRPr>
+                    </a:p>
+                  </a:txBody>
+                  <a:tcPr marL="68580" marR="68580" marT="0" marB="0"/>
+                </a:tc>
+                <a:tc vMerge="1">
+                  <a:txBody>
+                    <a:bodyPr/>
+                    <a:lstStyle/>
+                    <a:p>
+                      <a:pPr>
+                        <a:lnSpc>
+                          <a:spcPct val="107000"/>
+                        </a:lnSpc>
+                        <a:spcAft>
+                          <a:spcPts val="0"/>
+                        </a:spcAft>
+                      </a:pPr>
+                      <a:endParaRPr lang="fr-FR" sz="1100" dirty="0">
+                        <a:effectLst/>
+                        <a:latin typeface="+mn-lt"/>
+                        <a:ea typeface="Calibri" panose="020F0502020204030204" pitchFamily="34" charset="0"/>
+                        <a:cs typeface="Times New Roman" panose="02020603050405020304" pitchFamily="18" charset="0"/>
+                      </a:endParaRPr>
+                    </a:p>
+                  </a:txBody>
+                  <a:tcPr marL="68580" marR="68580" marT="0" marB="0"/>
+                </a:tc>
+                <a:tc>
+                  <a:txBody>
+                    <a:bodyPr/>
+                    <a:lstStyle/>
+                    <a:p>
+                      <a:pPr>
+                        <a:lnSpc>
+                          <a:spcPct val="107000"/>
+                        </a:lnSpc>
+                        <a:spcAft>
+                          <a:spcPts val="0"/>
+                        </a:spcAft>
+                      </a:pPr>
+                      <a:r>
+                        <a:rPr lang="fr-FR" sz="1100" dirty="0">
+                          <a:effectLst/>
+                          <a:latin typeface="+mn-lt"/>
+                          <a:ea typeface="Calibri" panose="020F0502020204030204" pitchFamily="34" charset="0"/>
+                          <a:cs typeface="Times New Roman" panose="02020603050405020304" pitchFamily="18" charset="0"/>
+                        </a:rPr>
+                        <a:t>FP5.2</a:t>
+                      </a:r>
+                    </a:p>
+                  </a:txBody>
+                  <a:tcPr marL="68580" marR="68580" marT="0" marB="0"/>
+                </a:tc>
+                <a:tc>
+                  <a:txBody>
+                    <a:bodyPr/>
+                    <a:lstStyle/>
+                    <a:p>
+                      <a:pPr>
+                        <a:lnSpc>
+                          <a:spcPct val="107000"/>
+                        </a:lnSpc>
+                        <a:spcAft>
+                          <a:spcPts val="0"/>
+                        </a:spcAft>
+                      </a:pPr>
+                      <a:r>
+                        <a:rPr lang="fr-FR" sz="1100" dirty="0">
+                          <a:effectLst/>
+                          <a:latin typeface="+mn-lt"/>
+                          <a:ea typeface="Calibri" panose="020F0502020204030204" pitchFamily="34" charset="0"/>
+                          <a:cs typeface="Times New Roman" panose="02020603050405020304" pitchFamily="18" charset="0"/>
+                        </a:rPr>
+                        <a:t>Voie</a:t>
+                      </a:r>
+                    </a:p>
+                  </a:txBody>
+                  <a:tcPr marL="68580" marR="68580" marT="0" marB="0"/>
+                </a:tc>
+                <a:tc>
+                  <a:txBody>
+                    <a:bodyPr/>
+                    <a:lstStyle/>
+                    <a:p>
+                      <a:pPr>
+                        <a:lnSpc>
+                          <a:spcPct val="107000"/>
+                        </a:lnSpc>
+                        <a:spcAft>
+                          <a:spcPts val="0"/>
+                        </a:spcAft>
+                      </a:pPr>
+                      <a:endParaRPr lang="fr-FR" sz="1100">
+                        <a:effectLst/>
+                        <a:latin typeface="+mn-lt"/>
+                        <a:ea typeface="Calibri" panose="020F0502020204030204" pitchFamily="34" charset="0"/>
+                        <a:cs typeface="Times New Roman" panose="02020603050405020304" pitchFamily="18" charset="0"/>
+                      </a:endParaRPr>
+                    </a:p>
+                  </a:txBody>
+                  <a:tcPr marL="68580" marR="68580" marT="0" marB="0"/>
+                </a:tc>
+                <a:tc>
+                  <a:txBody>
+                    <a:bodyPr/>
+                    <a:lstStyle/>
+                    <a:p>
+                      <a:pPr>
+                        <a:lnSpc>
+                          <a:spcPct val="107000"/>
+                        </a:lnSpc>
+                        <a:spcAft>
+                          <a:spcPts val="0"/>
+                        </a:spcAft>
+                      </a:pPr>
+                      <a:endParaRPr lang="fr-FR" sz="1100">
+                        <a:effectLst/>
+                        <a:latin typeface="+mn-lt"/>
+                        <a:ea typeface="Calibri" panose="020F0502020204030204" pitchFamily="34" charset="0"/>
+                        <a:cs typeface="Times New Roman" panose="02020603050405020304" pitchFamily="18" charset="0"/>
+                      </a:endParaRPr>
+                    </a:p>
+                  </a:txBody>
+                  <a:tcPr marL="68580" marR="68580" marT="0" marB="0"/>
+                </a:tc>
+                <a:tc>
+                  <a:txBody>
+                    <a:bodyPr/>
+                    <a:lstStyle/>
+                    <a:p>
+                      <a:pPr>
+                        <a:lnSpc>
+                          <a:spcPct val="107000"/>
+                        </a:lnSpc>
+                        <a:spcAft>
+                          <a:spcPts val="0"/>
+                        </a:spcAft>
+                      </a:pPr>
+                      <a:endParaRPr lang="fr-FR" sz="1100" dirty="0">
+                        <a:effectLst/>
+                        <a:latin typeface="+mn-lt"/>
+                        <a:ea typeface="Calibri" panose="020F0502020204030204" pitchFamily="34" charset="0"/>
+                        <a:cs typeface="Times New Roman" panose="02020603050405020304" pitchFamily="18" charset="0"/>
+                      </a:endParaRPr>
+                    </a:p>
+                  </a:txBody>
+                  <a:tcPr marL="68580" marR="68580" marT="0" marB="0"/>
+                </a:tc>
+                <a:extLst>
+                  <a:ext uri="{0D108BD9-81ED-4DB2-BD59-A6C34878D82A}">
+                    <a16:rowId xmlns:a16="http://schemas.microsoft.com/office/drawing/2014/main" val="624755865"/>
+                  </a:ext>
+                </a:extLst>
+              </a:tr>
+              <a:tr h="187071">
+                <a:tc vMerge="1">
+                  <a:txBody>
+                    <a:bodyPr/>
+                    <a:lstStyle/>
+                    <a:p>
+                      <a:pPr>
+                        <a:lnSpc>
+                          <a:spcPct val="107000"/>
+                        </a:lnSpc>
+                        <a:spcAft>
+                          <a:spcPts val="0"/>
+                        </a:spcAft>
+                      </a:pPr>
+                      <a:endParaRPr lang="fr-FR" sz="1100" dirty="0">
+                        <a:effectLst/>
+                        <a:latin typeface="+mn-lt"/>
+                        <a:ea typeface="Calibri" panose="020F0502020204030204" pitchFamily="34" charset="0"/>
+                        <a:cs typeface="Times New Roman" panose="02020603050405020304" pitchFamily="18" charset="0"/>
+                      </a:endParaRPr>
+                    </a:p>
+                  </a:txBody>
+                  <a:tcPr marL="68580" marR="68580" marT="0" marB="0"/>
+                </a:tc>
+                <a:tc vMerge="1">
+                  <a:txBody>
+                    <a:bodyPr/>
+                    <a:lstStyle/>
+                    <a:p>
+                      <a:pPr>
+                        <a:lnSpc>
+                          <a:spcPct val="107000"/>
+                        </a:lnSpc>
+                        <a:spcAft>
+                          <a:spcPts val="0"/>
+                        </a:spcAft>
+                      </a:pPr>
+                      <a:endParaRPr lang="fr-FR" sz="1100" dirty="0">
+                        <a:effectLst/>
+                        <a:latin typeface="+mn-lt"/>
+                        <a:ea typeface="Calibri" panose="020F0502020204030204" pitchFamily="34" charset="0"/>
+                        <a:cs typeface="Times New Roman" panose="02020603050405020304" pitchFamily="18" charset="0"/>
+                      </a:endParaRPr>
+                    </a:p>
+                  </a:txBody>
+                  <a:tcPr marL="68580" marR="68580" marT="0" marB="0"/>
+                </a:tc>
+                <a:tc>
+                  <a:txBody>
+                    <a:bodyPr/>
+                    <a:lstStyle/>
+                    <a:p>
+                      <a:pPr>
+                        <a:lnSpc>
+                          <a:spcPct val="107000"/>
+                        </a:lnSpc>
+                        <a:spcAft>
+                          <a:spcPts val="0"/>
+                        </a:spcAft>
+                      </a:pPr>
+                      <a:r>
+                        <a:rPr lang="fr-FR" sz="1100" dirty="0">
+                          <a:effectLst/>
+                          <a:latin typeface="+mn-lt"/>
+                          <a:ea typeface="Calibri" panose="020F0502020204030204" pitchFamily="34" charset="0"/>
+                          <a:cs typeface="Times New Roman" panose="02020603050405020304" pitchFamily="18" charset="0"/>
+                        </a:rPr>
+                        <a:t>FP5.3</a:t>
+                      </a:r>
+                    </a:p>
+                  </a:txBody>
+                  <a:tcPr marL="68580" marR="68580" marT="0" marB="0"/>
+                </a:tc>
+                <a:tc>
+                  <a:txBody>
+                    <a:bodyPr/>
+                    <a:lstStyle/>
+                    <a:p>
+                      <a:pPr>
+                        <a:lnSpc>
+                          <a:spcPct val="107000"/>
+                        </a:lnSpc>
+                        <a:spcAft>
+                          <a:spcPts val="0"/>
+                        </a:spcAft>
+                      </a:pPr>
+                      <a:r>
+                        <a:rPr lang="fr-FR" sz="1100" dirty="0">
+                          <a:effectLst/>
+                          <a:latin typeface="+mn-lt"/>
+                          <a:ea typeface="Calibri" panose="020F0502020204030204" pitchFamily="34" charset="0"/>
+                          <a:cs typeface="Times New Roman" panose="02020603050405020304" pitchFamily="18" charset="0"/>
+                        </a:rPr>
+                        <a:t>Empattement</a:t>
+                      </a:r>
+                    </a:p>
+                  </a:txBody>
+                  <a:tcPr marL="68580" marR="68580" marT="0" marB="0"/>
+                </a:tc>
+                <a:tc>
+                  <a:txBody>
+                    <a:bodyPr/>
+                    <a:lstStyle/>
+                    <a:p>
+                      <a:pPr>
+                        <a:lnSpc>
+                          <a:spcPct val="107000"/>
+                        </a:lnSpc>
+                        <a:spcAft>
+                          <a:spcPts val="0"/>
+                        </a:spcAft>
+                      </a:pPr>
+                      <a:endParaRPr lang="fr-FR" sz="1100">
+                        <a:effectLst/>
+                        <a:latin typeface="+mn-lt"/>
+                        <a:ea typeface="Calibri" panose="020F0502020204030204" pitchFamily="34" charset="0"/>
+                        <a:cs typeface="Times New Roman" panose="02020603050405020304" pitchFamily="18" charset="0"/>
+                      </a:endParaRPr>
+                    </a:p>
+                  </a:txBody>
+                  <a:tcPr marL="68580" marR="68580" marT="0" marB="0"/>
+                </a:tc>
+                <a:tc>
+                  <a:txBody>
+                    <a:bodyPr/>
+                    <a:lstStyle/>
+                    <a:p>
+                      <a:pPr>
+                        <a:lnSpc>
+                          <a:spcPct val="107000"/>
+                        </a:lnSpc>
+                        <a:spcAft>
+                          <a:spcPts val="0"/>
+                        </a:spcAft>
+                      </a:pPr>
+                      <a:endParaRPr lang="fr-FR" sz="1100">
+                        <a:effectLst/>
+                        <a:latin typeface="+mn-lt"/>
+                        <a:ea typeface="Calibri" panose="020F0502020204030204" pitchFamily="34" charset="0"/>
+                        <a:cs typeface="Times New Roman" panose="02020603050405020304" pitchFamily="18" charset="0"/>
+                      </a:endParaRPr>
+                    </a:p>
+                  </a:txBody>
+                  <a:tcPr marL="68580" marR="68580" marT="0" marB="0"/>
+                </a:tc>
+                <a:tc>
+                  <a:txBody>
+                    <a:bodyPr/>
+                    <a:lstStyle/>
+                    <a:p>
+                      <a:pPr>
+                        <a:lnSpc>
+                          <a:spcPct val="107000"/>
+                        </a:lnSpc>
+                        <a:spcAft>
+                          <a:spcPts val="0"/>
+                        </a:spcAft>
+                      </a:pPr>
+                      <a:endParaRPr lang="fr-FR" sz="1100" dirty="0">
+                        <a:effectLst/>
+                        <a:latin typeface="+mn-lt"/>
+                        <a:ea typeface="Calibri" panose="020F0502020204030204" pitchFamily="34" charset="0"/>
+                        <a:cs typeface="Times New Roman" panose="02020603050405020304" pitchFamily="18" charset="0"/>
+                      </a:endParaRPr>
+                    </a:p>
+                  </a:txBody>
+                  <a:tcPr marL="68580" marR="68580" marT="0" marB="0"/>
+                </a:tc>
+                <a:extLst>
+                  <a:ext uri="{0D108BD9-81ED-4DB2-BD59-A6C34878D82A}">
+                    <a16:rowId xmlns:a16="http://schemas.microsoft.com/office/drawing/2014/main" val="3338016103"/>
+                  </a:ext>
+                </a:extLst>
+              </a:tr>
+              <a:tr h="187071">
+                <a:tc vMerge="1">
+                  <a:txBody>
+                    <a:bodyPr/>
+                    <a:lstStyle/>
+                    <a:p>
+                      <a:pPr>
+                        <a:lnSpc>
+                          <a:spcPct val="107000"/>
+                        </a:lnSpc>
+                        <a:spcAft>
+                          <a:spcPts val="0"/>
+                        </a:spcAft>
+                      </a:pPr>
+                      <a:endParaRPr lang="fr-FR" sz="1100" dirty="0">
+                        <a:effectLst/>
+                        <a:latin typeface="+mn-lt"/>
+                        <a:ea typeface="Calibri" panose="020F0502020204030204" pitchFamily="34" charset="0"/>
+                        <a:cs typeface="Times New Roman" panose="02020603050405020304" pitchFamily="18" charset="0"/>
+                      </a:endParaRPr>
+                    </a:p>
+                  </a:txBody>
+                  <a:tcPr marL="68580" marR="68580" marT="0" marB="0"/>
+                </a:tc>
+                <a:tc vMerge="1">
+                  <a:txBody>
+                    <a:bodyPr/>
+                    <a:lstStyle/>
+                    <a:p>
+                      <a:pPr>
+                        <a:lnSpc>
+                          <a:spcPct val="107000"/>
+                        </a:lnSpc>
+                        <a:spcAft>
+                          <a:spcPts val="0"/>
+                        </a:spcAft>
+                      </a:pPr>
+                      <a:endParaRPr lang="fr-FR" sz="1100" dirty="0">
+                        <a:effectLst/>
+                        <a:latin typeface="+mn-lt"/>
+                        <a:ea typeface="Calibri" panose="020F0502020204030204" pitchFamily="34" charset="0"/>
+                        <a:cs typeface="Times New Roman" panose="02020603050405020304" pitchFamily="18" charset="0"/>
+                      </a:endParaRPr>
+                    </a:p>
+                  </a:txBody>
+                  <a:tcPr marL="68580" marR="68580" marT="0" marB="0"/>
+                </a:tc>
+                <a:tc>
+                  <a:txBody>
+                    <a:bodyPr/>
+                    <a:lstStyle/>
+                    <a:p>
+                      <a:pPr>
+                        <a:lnSpc>
+                          <a:spcPct val="107000"/>
+                        </a:lnSpc>
+                        <a:spcAft>
+                          <a:spcPts val="0"/>
+                        </a:spcAft>
+                      </a:pPr>
+                      <a:r>
+                        <a:rPr lang="fr-FR" sz="1100" dirty="0">
+                          <a:effectLst/>
+                          <a:latin typeface="+mn-lt"/>
+                          <a:ea typeface="Calibri" panose="020F0502020204030204" pitchFamily="34" charset="0"/>
+                          <a:cs typeface="Times New Roman" panose="02020603050405020304" pitchFamily="18" charset="0"/>
+                        </a:rPr>
+                        <a:t>FP5.4</a:t>
+                      </a:r>
+                    </a:p>
+                  </a:txBody>
+                  <a:tcPr marL="68580" marR="68580" marT="0" marB="0"/>
+                </a:tc>
+                <a:tc>
+                  <a:txBody>
+                    <a:bodyPr/>
+                    <a:lstStyle/>
+                    <a:p>
+                      <a:pPr>
+                        <a:lnSpc>
+                          <a:spcPct val="107000"/>
+                        </a:lnSpc>
+                        <a:spcAft>
+                          <a:spcPts val="0"/>
+                        </a:spcAft>
+                      </a:pPr>
+                      <a:r>
+                        <a:rPr lang="fr-FR" sz="1100" dirty="0">
+                          <a:effectLst/>
+                          <a:latin typeface="+mn-lt"/>
+                          <a:ea typeface="Calibri" panose="020F0502020204030204" pitchFamily="34" charset="0"/>
+                          <a:cs typeface="Times New Roman" panose="02020603050405020304" pitchFamily="18" charset="0"/>
+                        </a:rPr>
+                        <a:t>Garde au sol</a:t>
+                      </a:r>
+                    </a:p>
+                  </a:txBody>
+                  <a:tcPr marL="68580" marR="68580" marT="0" marB="0"/>
+                </a:tc>
+                <a:tc>
+                  <a:txBody>
+                    <a:bodyPr/>
+                    <a:lstStyle/>
+                    <a:p>
+                      <a:pPr>
+                        <a:lnSpc>
+                          <a:spcPct val="107000"/>
+                        </a:lnSpc>
+                        <a:spcAft>
+                          <a:spcPts val="0"/>
+                        </a:spcAft>
+                      </a:pPr>
+                      <a:endParaRPr lang="fr-FR" sz="1100">
+                        <a:effectLst/>
+                        <a:latin typeface="+mn-lt"/>
+                        <a:ea typeface="Calibri" panose="020F0502020204030204" pitchFamily="34" charset="0"/>
+                        <a:cs typeface="Times New Roman" panose="02020603050405020304" pitchFamily="18" charset="0"/>
+                      </a:endParaRPr>
+                    </a:p>
+                  </a:txBody>
+                  <a:tcPr marL="68580" marR="68580" marT="0" marB="0"/>
+                </a:tc>
+                <a:tc>
+                  <a:txBody>
+                    <a:bodyPr/>
+                    <a:lstStyle/>
+                    <a:p>
+                      <a:pPr>
+                        <a:lnSpc>
+                          <a:spcPct val="107000"/>
+                        </a:lnSpc>
+                        <a:spcAft>
+                          <a:spcPts val="0"/>
+                        </a:spcAft>
+                      </a:pPr>
+                      <a:endParaRPr lang="fr-FR" sz="1100">
+                        <a:effectLst/>
+                        <a:latin typeface="+mn-lt"/>
+                        <a:ea typeface="Calibri" panose="020F0502020204030204" pitchFamily="34" charset="0"/>
+                        <a:cs typeface="Times New Roman" panose="02020603050405020304" pitchFamily="18" charset="0"/>
+                      </a:endParaRPr>
+                    </a:p>
+                  </a:txBody>
+                  <a:tcPr marL="68580" marR="68580" marT="0" marB="0"/>
+                </a:tc>
+                <a:tc>
+                  <a:txBody>
+                    <a:bodyPr/>
+                    <a:lstStyle/>
+                    <a:p>
+                      <a:pPr>
+                        <a:lnSpc>
+                          <a:spcPct val="107000"/>
+                        </a:lnSpc>
+                        <a:spcAft>
+                          <a:spcPts val="0"/>
+                        </a:spcAft>
+                      </a:pPr>
+                      <a:endParaRPr lang="fr-FR" sz="1100" dirty="0">
+                        <a:effectLst/>
+                        <a:latin typeface="+mn-lt"/>
+                        <a:ea typeface="Calibri" panose="020F0502020204030204" pitchFamily="34" charset="0"/>
+                        <a:cs typeface="Times New Roman" panose="02020603050405020304" pitchFamily="18" charset="0"/>
+                      </a:endParaRPr>
+                    </a:p>
+                  </a:txBody>
+                  <a:tcPr marL="68580" marR="68580" marT="0" marB="0"/>
+                </a:tc>
+                <a:extLst>
+                  <a:ext uri="{0D108BD9-81ED-4DB2-BD59-A6C34878D82A}">
+                    <a16:rowId xmlns:a16="http://schemas.microsoft.com/office/drawing/2014/main" val="1485006670"/>
+                  </a:ext>
+                </a:extLst>
+              </a:tr>
+              <a:tr h="187071">
+                <a:tc rowSpan="3">
+                  <a:txBody>
+                    <a:bodyPr/>
+                    <a:lstStyle/>
+                    <a:p>
+                      <a:pPr>
+                        <a:lnSpc>
+                          <a:spcPct val="107000"/>
+                        </a:lnSpc>
+                        <a:spcAft>
+                          <a:spcPts val="0"/>
+                        </a:spcAft>
+                      </a:pPr>
+                      <a:r>
+                        <a:rPr lang="fr-FR" sz="1100" dirty="0">
+                          <a:effectLst/>
+                          <a:latin typeface="+mn-lt"/>
+                          <a:ea typeface="Calibri" panose="020F0502020204030204" pitchFamily="34" charset="0"/>
+                          <a:cs typeface="Times New Roman" panose="02020603050405020304" pitchFamily="18" charset="0"/>
+                        </a:rPr>
+                        <a:t>FP6</a:t>
+                      </a:r>
+                    </a:p>
+                  </a:txBody>
+                  <a:tcPr marL="68580" marR="68580" marT="0" marB="0"/>
+                </a:tc>
+                <a:tc rowSpan="3">
+                  <a:txBody>
+                    <a:bodyPr/>
+                    <a:lstStyle/>
+                    <a:p>
+                      <a:pPr>
+                        <a:lnSpc>
+                          <a:spcPct val="107000"/>
+                        </a:lnSpc>
+                        <a:spcAft>
+                          <a:spcPts val="0"/>
+                        </a:spcAft>
+                      </a:pPr>
+                      <a:r>
+                        <a:rPr lang="fr-FR" sz="1100" dirty="0">
+                          <a:effectLst/>
+                          <a:latin typeface="+mn-lt"/>
+                          <a:ea typeface="Calibri" panose="020F0502020204030204" pitchFamily="34" charset="0"/>
+                          <a:cs typeface="Times New Roman" panose="02020603050405020304" pitchFamily="18" charset="0"/>
+                        </a:rPr>
+                        <a:t>Liaison au sol</a:t>
+                      </a:r>
+                    </a:p>
+                  </a:txBody>
+                  <a:tcPr marL="68580" marR="68580" marT="0" marB="0"/>
+                </a:tc>
+                <a:tc>
+                  <a:txBody>
+                    <a:bodyPr/>
+                    <a:lstStyle/>
+                    <a:p>
+                      <a:pPr>
+                        <a:lnSpc>
+                          <a:spcPct val="107000"/>
+                        </a:lnSpc>
+                        <a:spcAft>
+                          <a:spcPts val="0"/>
+                        </a:spcAft>
+                      </a:pPr>
+                      <a:r>
+                        <a:rPr lang="fr-FR" sz="1100" dirty="0">
+                          <a:effectLst/>
+                          <a:latin typeface="+mn-lt"/>
+                          <a:ea typeface="Calibri" panose="020F0502020204030204" pitchFamily="34" charset="0"/>
+                          <a:cs typeface="Times New Roman" panose="02020603050405020304" pitchFamily="18" charset="0"/>
+                        </a:rPr>
+                        <a:t>FP6.1</a:t>
+                      </a:r>
+                    </a:p>
+                  </a:txBody>
+                  <a:tcPr marL="68580" marR="68580" marT="0" marB="0"/>
+                </a:tc>
+                <a:tc>
+                  <a:txBody>
+                    <a:bodyPr/>
+                    <a:lstStyle/>
+                    <a:p>
+                      <a:pPr>
+                        <a:lnSpc>
+                          <a:spcPct val="107000"/>
+                        </a:lnSpc>
+                        <a:spcAft>
+                          <a:spcPts val="0"/>
+                        </a:spcAft>
+                      </a:pPr>
+                      <a:r>
+                        <a:rPr lang="fr-FR" sz="1100" dirty="0">
+                          <a:effectLst/>
+                          <a:latin typeface="+mn-lt"/>
+                          <a:ea typeface="Calibri" panose="020F0502020204030204" pitchFamily="34" charset="0"/>
+                          <a:cs typeface="Times New Roman" panose="02020603050405020304" pitchFamily="18" charset="0"/>
+                        </a:rPr>
+                        <a:t>Accélération latérale et </a:t>
+                      </a:r>
+                      <a:r>
+                        <a:rPr lang="fr-FR" sz="1100">
+                          <a:effectLst/>
+                          <a:latin typeface="+mn-lt"/>
+                          <a:ea typeface="Calibri" panose="020F0502020204030204" pitchFamily="34" charset="0"/>
+                          <a:cs typeface="Times New Roman" panose="02020603050405020304" pitchFamily="18" charset="0"/>
+                        </a:rPr>
+                        <a:t>longitudinale maximum</a:t>
+                      </a:r>
+                      <a:endParaRPr lang="fr-FR" sz="1100" dirty="0">
+                        <a:effectLst/>
+                        <a:latin typeface="+mn-lt"/>
+                        <a:ea typeface="Calibri" panose="020F0502020204030204" pitchFamily="34" charset="0"/>
+                        <a:cs typeface="Times New Roman" panose="02020603050405020304" pitchFamily="18" charset="0"/>
+                      </a:endParaRPr>
+                    </a:p>
+                  </a:txBody>
+                  <a:tcPr marL="68580" marR="68580" marT="0" marB="0"/>
+                </a:tc>
+                <a:tc>
+                  <a:txBody>
+                    <a:bodyPr/>
+                    <a:lstStyle/>
+                    <a:p>
+                      <a:pPr>
+                        <a:lnSpc>
+                          <a:spcPct val="107000"/>
+                        </a:lnSpc>
+                        <a:spcAft>
+                          <a:spcPts val="0"/>
+                        </a:spcAft>
+                      </a:pPr>
+                      <a:endParaRPr lang="fr-FR" sz="1100">
+                        <a:effectLst/>
+                        <a:latin typeface="+mn-lt"/>
+                        <a:ea typeface="Calibri" panose="020F0502020204030204" pitchFamily="34" charset="0"/>
+                        <a:cs typeface="Times New Roman" panose="02020603050405020304" pitchFamily="18" charset="0"/>
+                      </a:endParaRPr>
+                    </a:p>
+                  </a:txBody>
+                  <a:tcPr marL="68580" marR="68580" marT="0" marB="0"/>
+                </a:tc>
+                <a:tc>
+                  <a:txBody>
+                    <a:bodyPr/>
+                    <a:lstStyle/>
+                    <a:p>
+                      <a:pPr>
+                        <a:lnSpc>
+                          <a:spcPct val="107000"/>
+                        </a:lnSpc>
+                        <a:spcAft>
+                          <a:spcPts val="0"/>
+                        </a:spcAft>
+                      </a:pPr>
+                      <a:endParaRPr lang="fr-FR" sz="1100">
+                        <a:effectLst/>
+                        <a:latin typeface="+mn-lt"/>
+                        <a:ea typeface="Calibri" panose="020F0502020204030204" pitchFamily="34" charset="0"/>
+                        <a:cs typeface="Times New Roman" panose="02020603050405020304" pitchFamily="18" charset="0"/>
+                      </a:endParaRPr>
+                    </a:p>
+                  </a:txBody>
+                  <a:tcPr marL="68580" marR="68580" marT="0" marB="0"/>
+                </a:tc>
+                <a:tc>
+                  <a:txBody>
+                    <a:bodyPr/>
+                    <a:lstStyle/>
+                    <a:p>
+                      <a:pPr>
+                        <a:lnSpc>
+                          <a:spcPct val="107000"/>
+                        </a:lnSpc>
+                        <a:spcAft>
+                          <a:spcPts val="0"/>
+                        </a:spcAft>
+                      </a:pPr>
+                      <a:endParaRPr lang="fr-FR" sz="1100" dirty="0">
+                        <a:effectLst/>
+                        <a:latin typeface="+mn-lt"/>
+                        <a:ea typeface="Calibri" panose="020F0502020204030204" pitchFamily="34" charset="0"/>
+                        <a:cs typeface="Times New Roman" panose="02020603050405020304" pitchFamily="18" charset="0"/>
+                      </a:endParaRPr>
+                    </a:p>
+                  </a:txBody>
+                  <a:tcPr marL="68580" marR="68580" marT="0" marB="0"/>
+                </a:tc>
+                <a:extLst>
+                  <a:ext uri="{0D108BD9-81ED-4DB2-BD59-A6C34878D82A}">
+                    <a16:rowId xmlns:a16="http://schemas.microsoft.com/office/drawing/2014/main" val="2964940703"/>
+                  </a:ext>
+                </a:extLst>
+              </a:tr>
+              <a:tr h="187071">
+                <a:tc vMerge="1">
+                  <a:txBody>
+                    <a:bodyPr/>
+                    <a:lstStyle/>
+                    <a:p>
+                      <a:pPr>
+                        <a:lnSpc>
+                          <a:spcPct val="107000"/>
+                        </a:lnSpc>
+                        <a:spcAft>
+                          <a:spcPts val="0"/>
+                        </a:spcAft>
+                      </a:pPr>
+                      <a:endParaRPr lang="fr-FR" sz="1100" dirty="0">
+                        <a:effectLst/>
+                        <a:latin typeface="+mn-lt"/>
+                        <a:ea typeface="Calibri" panose="020F0502020204030204" pitchFamily="34" charset="0"/>
+                        <a:cs typeface="Times New Roman" panose="02020603050405020304" pitchFamily="18" charset="0"/>
+                      </a:endParaRPr>
+                    </a:p>
+                  </a:txBody>
+                  <a:tcPr marL="68580" marR="68580" marT="0" marB="0"/>
+                </a:tc>
+                <a:tc vMerge="1">
+                  <a:txBody>
+                    <a:bodyPr/>
+                    <a:lstStyle/>
+                    <a:p>
+                      <a:pPr>
+                        <a:lnSpc>
+                          <a:spcPct val="107000"/>
+                        </a:lnSpc>
+                        <a:spcAft>
+                          <a:spcPts val="0"/>
+                        </a:spcAft>
+                      </a:pPr>
+                      <a:endParaRPr lang="fr-FR" sz="1100" dirty="0">
+                        <a:effectLst/>
+                        <a:latin typeface="+mn-lt"/>
+                        <a:ea typeface="Calibri" panose="020F0502020204030204" pitchFamily="34" charset="0"/>
+                        <a:cs typeface="Times New Roman" panose="02020603050405020304" pitchFamily="18" charset="0"/>
+                      </a:endParaRPr>
+                    </a:p>
+                  </a:txBody>
+                  <a:tcPr marL="68580" marR="68580" marT="0" marB="0"/>
+                </a:tc>
+                <a:tc>
+                  <a:txBody>
+                    <a:bodyPr/>
+                    <a:lstStyle/>
+                    <a:p>
+                      <a:pPr>
+                        <a:lnSpc>
+                          <a:spcPct val="107000"/>
+                        </a:lnSpc>
+                        <a:spcAft>
+                          <a:spcPts val="0"/>
+                        </a:spcAft>
+                      </a:pPr>
+                      <a:r>
+                        <a:rPr lang="fr-FR" sz="1100" dirty="0">
+                          <a:effectLst/>
+                          <a:latin typeface="+mn-lt"/>
+                          <a:ea typeface="Calibri" panose="020F0502020204030204" pitchFamily="34" charset="0"/>
+                          <a:cs typeface="Times New Roman" panose="02020603050405020304" pitchFamily="18" charset="0"/>
+                        </a:rPr>
+                        <a:t>FP6.2</a:t>
+                      </a:r>
+                    </a:p>
+                  </a:txBody>
+                  <a:tcPr marL="68580" marR="68580" marT="0" marB="0"/>
+                </a:tc>
+                <a:tc>
+                  <a:txBody>
+                    <a:bodyPr/>
+                    <a:lstStyle/>
+                    <a:p>
+                      <a:pPr>
+                        <a:lnSpc>
+                          <a:spcPct val="107000"/>
+                        </a:lnSpc>
+                        <a:spcAft>
+                          <a:spcPts val="0"/>
+                        </a:spcAft>
+                      </a:pPr>
+                      <a:r>
+                        <a:rPr lang="fr-FR" sz="1100" dirty="0">
+                          <a:effectLst/>
+                          <a:latin typeface="+mn-lt"/>
+                          <a:ea typeface="Calibri" panose="020F0502020204030204" pitchFamily="34" charset="0"/>
+                          <a:cs typeface="Times New Roman" panose="02020603050405020304" pitchFamily="18" charset="0"/>
+                        </a:rPr>
+                        <a:t>Décorréler roulis-plongée</a:t>
+                      </a:r>
+                    </a:p>
+                  </a:txBody>
+                  <a:tcPr marL="68580" marR="68580" marT="0" marB="0"/>
+                </a:tc>
+                <a:tc>
+                  <a:txBody>
+                    <a:bodyPr/>
+                    <a:lstStyle/>
+                    <a:p>
+                      <a:pPr>
+                        <a:lnSpc>
+                          <a:spcPct val="107000"/>
+                        </a:lnSpc>
+                        <a:spcAft>
+                          <a:spcPts val="0"/>
+                        </a:spcAft>
+                      </a:pPr>
+                      <a:endParaRPr lang="fr-FR" sz="1100">
+                        <a:effectLst/>
+                        <a:latin typeface="+mn-lt"/>
+                        <a:ea typeface="Calibri" panose="020F0502020204030204" pitchFamily="34" charset="0"/>
+                        <a:cs typeface="Times New Roman" panose="02020603050405020304" pitchFamily="18" charset="0"/>
+                      </a:endParaRPr>
+                    </a:p>
+                  </a:txBody>
+                  <a:tcPr marL="68580" marR="68580" marT="0" marB="0"/>
+                </a:tc>
+                <a:tc>
+                  <a:txBody>
+                    <a:bodyPr/>
+                    <a:lstStyle/>
+                    <a:p>
+                      <a:pPr>
+                        <a:lnSpc>
+                          <a:spcPct val="107000"/>
+                        </a:lnSpc>
+                        <a:spcAft>
+                          <a:spcPts val="0"/>
+                        </a:spcAft>
+                      </a:pPr>
+                      <a:endParaRPr lang="fr-FR" sz="1100">
+                        <a:effectLst/>
+                        <a:latin typeface="+mn-lt"/>
+                        <a:ea typeface="Calibri" panose="020F0502020204030204" pitchFamily="34" charset="0"/>
+                        <a:cs typeface="Times New Roman" panose="02020603050405020304" pitchFamily="18" charset="0"/>
+                      </a:endParaRPr>
+                    </a:p>
+                  </a:txBody>
+                  <a:tcPr marL="68580" marR="68580" marT="0" marB="0"/>
+                </a:tc>
+                <a:tc>
+                  <a:txBody>
+                    <a:bodyPr/>
+                    <a:lstStyle/>
+                    <a:p>
+                      <a:pPr>
+                        <a:lnSpc>
+                          <a:spcPct val="107000"/>
+                        </a:lnSpc>
+                        <a:spcAft>
+                          <a:spcPts val="0"/>
+                        </a:spcAft>
+                      </a:pPr>
+                      <a:endParaRPr lang="fr-FR" sz="1100" dirty="0">
+                        <a:effectLst/>
+                        <a:latin typeface="+mn-lt"/>
+                        <a:ea typeface="Calibri" panose="020F0502020204030204" pitchFamily="34" charset="0"/>
+                        <a:cs typeface="Times New Roman" panose="02020603050405020304" pitchFamily="18" charset="0"/>
+                      </a:endParaRPr>
+                    </a:p>
+                  </a:txBody>
+                  <a:tcPr marL="68580" marR="68580" marT="0" marB="0"/>
+                </a:tc>
+                <a:extLst>
+                  <a:ext uri="{0D108BD9-81ED-4DB2-BD59-A6C34878D82A}">
+                    <a16:rowId xmlns:a16="http://schemas.microsoft.com/office/drawing/2014/main" val="214137936"/>
+                  </a:ext>
+                </a:extLst>
+              </a:tr>
+              <a:tr h="187071">
+                <a:tc vMerge="1">
+                  <a:txBody>
+                    <a:bodyPr/>
+                    <a:lstStyle/>
+                    <a:p>
+                      <a:pPr>
+                        <a:lnSpc>
+                          <a:spcPct val="107000"/>
+                        </a:lnSpc>
+                        <a:spcAft>
+                          <a:spcPts val="0"/>
+                        </a:spcAft>
+                      </a:pPr>
+                      <a:endParaRPr lang="fr-FR" sz="1100" dirty="0">
+                        <a:effectLst/>
+                        <a:latin typeface="+mn-lt"/>
+                        <a:ea typeface="Calibri" panose="020F0502020204030204" pitchFamily="34" charset="0"/>
+                        <a:cs typeface="Times New Roman" panose="02020603050405020304" pitchFamily="18" charset="0"/>
+                      </a:endParaRPr>
+                    </a:p>
+                  </a:txBody>
+                  <a:tcPr marL="68580" marR="68580" marT="0" marB="0"/>
+                </a:tc>
+                <a:tc vMerge="1">
+                  <a:txBody>
+                    <a:bodyPr/>
+                    <a:lstStyle/>
+                    <a:p>
+                      <a:pPr>
+                        <a:lnSpc>
+                          <a:spcPct val="107000"/>
+                        </a:lnSpc>
+                        <a:spcAft>
+                          <a:spcPts val="0"/>
+                        </a:spcAft>
+                      </a:pPr>
+                      <a:endParaRPr lang="fr-FR" sz="1100" dirty="0">
+                        <a:effectLst/>
+                        <a:latin typeface="+mn-lt"/>
+                        <a:ea typeface="Calibri" panose="020F0502020204030204" pitchFamily="34" charset="0"/>
+                        <a:cs typeface="Times New Roman" panose="02020603050405020304" pitchFamily="18" charset="0"/>
+                      </a:endParaRPr>
+                    </a:p>
+                  </a:txBody>
+                  <a:tcPr marL="68580" marR="68580" marT="0" marB="0"/>
+                </a:tc>
+                <a:tc>
+                  <a:txBody>
+                    <a:bodyPr/>
+                    <a:lstStyle/>
+                    <a:p>
+                      <a:pPr>
+                        <a:lnSpc>
+                          <a:spcPct val="107000"/>
+                        </a:lnSpc>
+                        <a:spcAft>
+                          <a:spcPts val="0"/>
+                        </a:spcAft>
+                      </a:pPr>
+                      <a:r>
+                        <a:rPr lang="fr-FR" sz="1100" dirty="0">
+                          <a:effectLst/>
+                          <a:latin typeface="+mn-lt"/>
+                          <a:ea typeface="Calibri" panose="020F0502020204030204" pitchFamily="34" charset="0"/>
+                          <a:cs typeface="Times New Roman" panose="02020603050405020304" pitchFamily="18" charset="0"/>
+                        </a:rPr>
+                        <a:t>FP6.3</a:t>
+                      </a:r>
+                    </a:p>
+                  </a:txBody>
+                  <a:tcPr marL="68580" marR="68580" marT="0" marB="0"/>
+                </a:tc>
+                <a:tc>
+                  <a:txBody>
+                    <a:bodyPr/>
+                    <a:lstStyle/>
+                    <a:p>
+                      <a:pPr>
+                        <a:lnSpc>
+                          <a:spcPct val="107000"/>
+                        </a:lnSpc>
+                        <a:spcAft>
+                          <a:spcPts val="0"/>
+                        </a:spcAft>
+                      </a:pPr>
+                      <a:r>
+                        <a:rPr lang="fr-FR" sz="1100" dirty="0">
+                          <a:effectLst/>
+                          <a:latin typeface="+mn-lt"/>
+                          <a:ea typeface="Calibri" panose="020F0502020204030204" pitchFamily="34" charset="0"/>
+                          <a:cs typeface="Times New Roman" panose="02020603050405020304" pitchFamily="18" charset="0"/>
+                        </a:rPr>
+                        <a:t>Taille des pneus</a:t>
+                      </a:r>
+                    </a:p>
+                  </a:txBody>
+                  <a:tcPr marL="68580" marR="68580" marT="0" marB="0"/>
+                </a:tc>
+                <a:tc>
+                  <a:txBody>
+                    <a:bodyPr/>
+                    <a:lstStyle/>
+                    <a:p>
+                      <a:pPr>
+                        <a:lnSpc>
+                          <a:spcPct val="107000"/>
+                        </a:lnSpc>
+                        <a:spcAft>
+                          <a:spcPts val="0"/>
+                        </a:spcAft>
+                      </a:pPr>
+                      <a:endParaRPr lang="fr-FR" sz="1100">
+                        <a:effectLst/>
+                        <a:latin typeface="+mn-lt"/>
+                        <a:ea typeface="Calibri" panose="020F0502020204030204" pitchFamily="34" charset="0"/>
+                        <a:cs typeface="Times New Roman" panose="02020603050405020304" pitchFamily="18" charset="0"/>
+                      </a:endParaRPr>
+                    </a:p>
+                  </a:txBody>
+                  <a:tcPr marL="68580" marR="68580" marT="0" marB="0"/>
+                </a:tc>
+                <a:tc>
+                  <a:txBody>
+                    <a:bodyPr/>
+                    <a:lstStyle/>
+                    <a:p>
+                      <a:pPr>
+                        <a:lnSpc>
+                          <a:spcPct val="107000"/>
+                        </a:lnSpc>
+                        <a:spcAft>
+                          <a:spcPts val="0"/>
+                        </a:spcAft>
+                      </a:pPr>
+                      <a:endParaRPr lang="fr-FR" sz="1100">
+                        <a:effectLst/>
+                        <a:latin typeface="+mn-lt"/>
+                        <a:ea typeface="Calibri" panose="020F0502020204030204" pitchFamily="34" charset="0"/>
+                        <a:cs typeface="Times New Roman" panose="02020603050405020304" pitchFamily="18" charset="0"/>
+                      </a:endParaRPr>
+                    </a:p>
+                  </a:txBody>
+                  <a:tcPr marL="68580" marR="68580" marT="0" marB="0"/>
+                </a:tc>
+                <a:tc>
+                  <a:txBody>
+                    <a:bodyPr/>
+                    <a:lstStyle/>
+                    <a:p>
+                      <a:pPr>
+                        <a:lnSpc>
+                          <a:spcPct val="107000"/>
+                        </a:lnSpc>
+                        <a:spcAft>
+                          <a:spcPts val="0"/>
+                        </a:spcAft>
+                      </a:pPr>
+                      <a:endParaRPr lang="fr-FR" sz="1100" dirty="0">
+                        <a:effectLst/>
+                        <a:latin typeface="+mn-lt"/>
+                        <a:ea typeface="Calibri" panose="020F0502020204030204" pitchFamily="34" charset="0"/>
+                        <a:cs typeface="Times New Roman" panose="02020603050405020304" pitchFamily="18" charset="0"/>
+                      </a:endParaRPr>
+                    </a:p>
+                  </a:txBody>
+                  <a:tcPr marL="68580" marR="68580" marT="0" marB="0"/>
+                </a:tc>
+                <a:extLst>
+                  <a:ext uri="{0D108BD9-81ED-4DB2-BD59-A6C34878D82A}">
+                    <a16:rowId xmlns:a16="http://schemas.microsoft.com/office/drawing/2014/main" val="3245944959"/>
+                  </a:ext>
+                </a:extLst>
+              </a:tr>
+            </a:tbl>
+          </a:graphicData>
+        </a:graphic>
+      </p:graphicFrame>
     </p:spTree>
     <p:extLst>
       <p:ext uri="{BB962C8B-B14F-4D97-AF65-F5344CB8AC3E}">
-        <p14:creationId xmlns:p14="http://schemas.microsoft.com/office/powerpoint/2010/main" val="1421037825"/>
+        <p14:creationId xmlns:p14="http://schemas.microsoft.com/office/powerpoint/2010/main" val="3808356225"/>
       </p:ext>
     </p:extLst>
   </p:cSld>
@@ -6701,7 +9749,7 @@
                   <a:srgbClr val="C2381E"/>
                 </a:solidFill>
               </a:rPr>
-              <a:t>TOP Projet : Budget massique</a:t>
+              <a:t>TOP Projet : Budget financier</a:t>
             </a:r>
           </a:p>
         </p:txBody>
@@ -6709,7 +9757,7 @@
     </p:spTree>
     <p:extLst>
       <p:ext uri="{BB962C8B-B14F-4D97-AF65-F5344CB8AC3E}">
-        <p14:creationId xmlns:p14="http://schemas.microsoft.com/office/powerpoint/2010/main" val="2660608898"/>
+        <p14:creationId xmlns:p14="http://schemas.microsoft.com/office/powerpoint/2010/main" val="1421037825"/>
       </p:ext>
     </p:extLst>
   </p:cSld>
@@ -6785,6 +9833,90 @@
                   <a:srgbClr val="C2381E"/>
                 </a:solidFill>
               </a:rPr>
+              <a:t>TOP Projet : Budget massique</a:t>
+            </a:r>
+          </a:p>
+        </p:txBody>
+      </p:sp>
+    </p:spTree>
+    <p:extLst>
+      <p:ext uri="{BB962C8B-B14F-4D97-AF65-F5344CB8AC3E}">
+        <p14:creationId xmlns:p14="http://schemas.microsoft.com/office/powerpoint/2010/main" val="2660608898"/>
+      </p:ext>
+    </p:extLst>
+  </p:cSld>
+  <p:clrMapOvr>
+    <a:masterClrMapping/>
+  </p:clrMapOvr>
+</p:sld>
+</file>
+
+<file path=ppt/slides/slide8.xml><?xml version="1.0" encoding="utf-8"?>
+<p:sld xmlns:a="http://schemas.openxmlformats.org/drawingml/2006/main" xmlns:r="http://schemas.openxmlformats.org/officeDocument/2006/relationships" xmlns:p="http://schemas.openxmlformats.org/presentationml/2006/main">
+  <p:cSld>
+    <p:bg>
+      <p:bgPr>
+        <a:blipFill dpi="0" rotWithShape="1">
+          <a:blip r:embed="rId2">
+            <a:lum/>
+          </a:blip>
+          <a:srcRect/>
+          <a:stretch>
+            <a:fillRect/>
+          </a:stretch>
+        </a:blipFill>
+        <a:effectLst/>
+      </p:bgPr>
+    </p:bg>
+    <p:spTree>
+      <p:nvGrpSpPr>
+        <p:cNvPr id="1" name=""/>
+        <p:cNvGrpSpPr/>
+        <p:nvPr/>
+      </p:nvGrpSpPr>
+      <p:grpSpPr>
+        <a:xfrm>
+          <a:off x="0" y="0"/>
+          <a:ext cx="0" cy="0"/>
+          <a:chOff x="0" y="0"/>
+          <a:chExt cx="0" cy="0"/>
+        </a:xfrm>
+      </p:grpSpPr>
+      <p:sp>
+        <p:nvSpPr>
+          <p:cNvPr id="4" name="ZoneTexte 3">
+            <a:extLst>
+              <a:ext uri="{FF2B5EF4-FFF2-40B4-BE49-F238E27FC236}">
+                <a16:creationId xmlns:a16="http://schemas.microsoft.com/office/drawing/2014/main" id="{11CB7687-B471-4549-A848-8326224DD138}"/>
+              </a:ext>
+            </a:extLst>
+          </p:cNvPr>
+          <p:cNvSpPr txBox="1"/>
+          <p:nvPr/>
+        </p:nvSpPr>
+        <p:spPr>
+          <a:xfrm>
+            <a:off x="0" y="547255"/>
+            <a:ext cx="12191999" cy="461665"/>
+          </a:xfrm>
+          <a:prstGeom prst="rect">
+            <a:avLst/>
+          </a:prstGeom>
+          <a:noFill/>
+        </p:spPr>
+        <p:txBody>
+          <a:bodyPr wrap="square" rtlCol="0">
+            <a:spAutoFit/>
+          </a:bodyPr>
+          <a:lstStyle/>
+          <a:p>
+            <a:pPr algn="ctr"/>
+            <a:r>
+              <a:rPr lang="fr-FR" sz="2400" b="1" u="sng" dirty="0">
+                <a:solidFill>
+                  <a:srgbClr val="C2381E"/>
+                </a:solidFill>
+              </a:rPr>
               <a:t>TOP Projet : Budget heures/hommes</a:t>
             </a:r>
           </a:p>
@@ -6803,7 +9935,7 @@
 </p:sld>
 </file>
 
-<file path=ppt/slides/slide8.xml><?xml version="1.0" encoding="utf-8"?>
+<file path=ppt/slides/slide9.xml><?xml version="1.0" encoding="utf-8"?>
 <p:sld xmlns:a="http://schemas.openxmlformats.org/drawingml/2006/main" xmlns:r="http://schemas.openxmlformats.org/officeDocument/2006/relationships" xmlns:p="http://schemas.openxmlformats.org/presentationml/2006/main">
   <p:cSld>
     <p:bg>

</xml_diff>